<commit_message>
Completed exponential background analysis. Question about high energy tail
</commit_message>
<xml_diff>
--- a/Article2020/Analysing_NP.pptx
+++ b/Article2020/Analysing_NP.pptx
@@ -9,6 +9,11 @@
     <p:sldId id="257" r:id="rId3"/>
     <p:sldId id="258" r:id="rId4"/>
     <p:sldId id="259" r:id="rId5"/>
+    <p:sldId id="260" r:id="rId6"/>
+    <p:sldId id="261" r:id="rId7"/>
+    <p:sldId id="262" r:id="rId8"/>
+    <p:sldId id="263" r:id="rId9"/>
+    <p:sldId id="264" r:id="rId10"/>
   </p:sldIdLst>
   <p:sldSz cx="12192000" cy="6858000"/>
   <p:notesSz cx="6858000" cy="9144000"/>
@@ -3104,12 +3109,30 @@
         </p:nvSpPr>
         <p:spPr/>
         <p:txBody>
-          <a:bodyPr/>
+          <a:bodyPr>
+            <a:normAutofit/>
+          </a:bodyPr>
           <a:lstStyle/>
           <a:p>
             <a:r>
               <a:rPr lang="en-GB" dirty="0" smtClean="0"/>
-              <a:t>Background1: </a:t>
+              <a:t>Background1 (</a:t>
+            </a:r>
+            <a:r>
+              <a:rPr lang="en-GB" b="1" dirty="0" err="1"/>
+              <a:t>cut_at_edges</a:t>
+            </a:r>
+            <a:r>
+              <a:rPr lang="en-GB" b="1" dirty="0" smtClean="0"/>
+              <a:t>)</a:t>
+            </a:r>
+            <a:r>
+              <a:rPr lang="en-GB" dirty="0" smtClean="0"/>
+              <a:t>:</a:t>
+            </a:r>
+            <a:r>
+              <a:rPr lang="en-GB" dirty="0" smtClean="0"/>
+              <a:t/>
             </a:r>
             <a:br>
               <a:rPr lang="en-GB" dirty="0" smtClean="0"/>
@@ -3352,7 +3375,7 @@
       </p:sp>
       <p:pic>
         <p:nvPicPr>
-          <p:cNvPr id="5" name="Picture 4"/>
+          <p:cNvPr id="6" name="Picture 5"/>
           <p:cNvPicPr>
             <a:picLocks/>
           </p:cNvPicPr>
@@ -3366,7 +3389,7 @@
         </p:blipFill>
         <p:spPr>
           <a:xfrm>
-            <a:off x="-1" y="718887"/>
+            <a:off x="2999710" y="3597773"/>
             <a:ext cx="2880000" cy="2520000"/>
           </a:xfrm>
           <a:prstGeom prst="rect">
@@ -3376,7 +3399,7 @@
       </p:pic>
       <p:pic>
         <p:nvPicPr>
-          <p:cNvPr id="6" name="Picture 5"/>
+          <p:cNvPr id="10" name="Picture 9"/>
           <p:cNvPicPr>
             <a:picLocks/>
           </p:cNvPicPr>
@@ -3390,8 +3413,8 @@
         </p:blipFill>
         <p:spPr>
           <a:xfrm>
-            <a:off x="3011083" y="3441032"/>
-            <a:ext cx="2880000" cy="2880000"/>
+            <a:off x="220908" y="673769"/>
+            <a:ext cx="2880000" cy="2520000"/>
           </a:xfrm>
           <a:prstGeom prst="rect">
             <a:avLst/>
@@ -3400,7 +3423,7 @@
       </p:pic>
       <p:pic>
         <p:nvPicPr>
-          <p:cNvPr id="7" name="Picture 6"/>
+          <p:cNvPr id="11" name="Picture 10"/>
           <p:cNvPicPr>
             <a:picLocks/>
           </p:cNvPicPr>
@@ -3414,8 +3437,8 @@
         </p:blipFill>
         <p:spPr>
           <a:xfrm>
-            <a:off x="-1" y="3441032"/>
-            <a:ext cx="2880000" cy="2880000"/>
+            <a:off x="220908" y="3597773"/>
+            <a:ext cx="2880000" cy="2520000"/>
           </a:xfrm>
           <a:prstGeom prst="rect">
             <a:avLst/>
@@ -3424,7 +3447,7 @@
       </p:pic>
       <p:pic>
         <p:nvPicPr>
-          <p:cNvPr id="8" name="Picture 7"/>
+          <p:cNvPr id="12" name="Picture 11"/>
           <p:cNvPicPr>
             <a:picLocks/>
           </p:cNvPicPr>
@@ -3438,7 +3461,7 @@
         </p:blipFill>
         <p:spPr>
           <a:xfrm>
-            <a:off x="8950120" y="673769"/>
+            <a:off x="6138902" y="718887"/>
             <a:ext cx="2880000" cy="2520000"/>
           </a:xfrm>
           <a:prstGeom prst="rect">
@@ -3448,7 +3471,7 @@
       </p:pic>
       <p:pic>
         <p:nvPicPr>
-          <p:cNvPr id="9" name="Picture 8"/>
+          <p:cNvPr id="13" name="Picture 12"/>
           <p:cNvPicPr>
             <a:picLocks/>
           </p:cNvPicPr>
@@ -3462,7 +3485,55 @@
         </p:blipFill>
         <p:spPr>
           <a:xfrm>
-            <a:off x="6280763" y="673769"/>
+            <a:off x="9018902" y="718887"/>
+            <a:ext cx="2880000" cy="2520000"/>
+          </a:xfrm>
+          <a:prstGeom prst="rect">
+            <a:avLst/>
+          </a:prstGeom>
+        </p:spPr>
+      </p:pic>
+      <p:pic>
+        <p:nvPicPr>
+          <p:cNvPr id="14" name="Picture 13"/>
+          <p:cNvPicPr>
+            <a:picLocks/>
+          </p:cNvPicPr>
+          <p:nvPr/>
+        </p:nvPicPr>
+        <p:blipFill>
+          <a:blip r:embed="rId8"/>
+          <a:stretch>
+            <a:fillRect/>
+          </a:stretch>
+        </p:blipFill>
+        <p:spPr>
+          <a:xfrm>
+            <a:off x="6138902" y="3597773"/>
+            <a:ext cx="2880000" cy="2520000"/>
+          </a:xfrm>
+          <a:prstGeom prst="rect">
+            <a:avLst/>
+          </a:prstGeom>
+        </p:spPr>
+      </p:pic>
+      <p:pic>
+        <p:nvPicPr>
+          <p:cNvPr id="15" name="Picture 14"/>
+          <p:cNvPicPr>
+            <a:picLocks/>
+          </p:cNvPicPr>
+          <p:nvPr/>
+        </p:nvPicPr>
+        <p:blipFill>
+          <a:blip r:embed="rId9"/>
+          <a:stretch>
+            <a:fillRect/>
+          </a:stretch>
+        </p:blipFill>
+        <p:spPr>
+          <a:xfrm>
+            <a:off x="9018902" y="3597773"/>
             <a:ext cx="2880000" cy="2520000"/>
           </a:xfrm>
           <a:prstGeom prst="rect">
@@ -3510,18 +3581,37 @@
             <p:ph type="title"/>
           </p:nvPr>
         </p:nvSpPr>
-        <p:spPr/>
-        <p:txBody>
-          <a:bodyPr/>
-          <a:lstStyle/>
-          <a:p>
-            <a:r>
-              <a:rPr lang="en-GB" dirty="0" err="1" smtClean="0"/>
+        <p:spPr>
+          <a:xfrm>
+            <a:off x="5221705" y="0"/>
+            <a:ext cx="5987716" cy="1325563"/>
+          </a:xfrm>
+        </p:spPr>
+        <p:txBody>
+          <a:bodyPr>
+            <a:normAutofit/>
+          </a:bodyPr>
+          <a:lstStyle/>
+          <a:p>
+            <a:r>
+              <a:rPr lang="en-GB" sz="3100" dirty="0" err="1" smtClean="0"/>
               <a:t>sym_cut</a:t>
             </a:r>
             <a:r>
+              <a:rPr lang="en-GB" sz="3100" dirty="0" smtClean="0"/>
+              <a:t> with Background1 (</a:t>
+            </a:r>
+            <a:r>
+              <a:rPr lang="en-GB" sz="3100" b="1" dirty="0" err="1" smtClean="0"/>
+              <a:t>cut_at_edges</a:t>
+            </a:r>
+            <a:r>
+              <a:rPr lang="en-GB" sz="3100" b="1" dirty="0" smtClean="0"/>
+              <a:t>)</a:t>
+            </a:r>
+            <a:r>
               <a:rPr lang="en-GB" dirty="0" smtClean="0"/>
-              <a:t> with Background1:</a:t>
+              <a:t>: </a:t>
             </a:r>
             <a:endParaRPr lang="en-GB" dirty="0"/>
           </a:p>
@@ -3543,8 +3633,8 @@
         </p:blipFill>
         <p:spPr>
           <a:xfrm>
-            <a:off x="838200" y="2066424"/>
-            <a:ext cx="5334000" cy="4000500"/>
+            <a:off x="499309" y="201531"/>
+            <a:ext cx="4320000" cy="3240000"/>
           </a:xfrm>
           <a:prstGeom prst="rect">
             <a:avLst/>
@@ -3567,8 +3657,228 @@
         </p:blipFill>
         <p:spPr>
           <a:xfrm>
-            <a:off x="6301539" y="2066424"/>
+            <a:off x="6392117" y="1217279"/>
             <a:ext cx="5219700" cy="4000500"/>
+          </a:xfrm>
+          <a:prstGeom prst="rect">
+            <a:avLst/>
+          </a:prstGeom>
+        </p:spPr>
+      </p:pic>
+      <p:pic>
+        <p:nvPicPr>
+          <p:cNvPr id="6" name="Picture 5"/>
+          <p:cNvPicPr>
+            <a:picLocks noChangeAspect="1"/>
+          </p:cNvPicPr>
+          <p:nvPr/>
+        </p:nvPicPr>
+        <p:blipFill>
+          <a:blip r:embed="rId4"/>
+          <a:stretch>
+            <a:fillRect/>
+          </a:stretch>
+        </p:blipFill>
+        <p:spPr>
+          <a:xfrm>
+            <a:off x="499309" y="3441531"/>
+            <a:ext cx="4320000" cy="3240000"/>
+          </a:xfrm>
+          <a:prstGeom prst="rect">
+            <a:avLst/>
+          </a:prstGeom>
+        </p:spPr>
+      </p:pic>
+      <p:sp>
+        <p:nvSpPr>
+          <p:cNvPr id="7" name="TextBox 6"/>
+          <p:cNvSpPr txBox="1"/>
+          <p:nvPr/>
+        </p:nvSpPr>
+        <p:spPr>
+          <a:xfrm>
+            <a:off x="893462" y="3537784"/>
+            <a:ext cx="3141501" cy="369332"/>
+          </a:xfrm>
+          <a:prstGeom prst="rect">
+            <a:avLst/>
+          </a:prstGeom>
+          <a:solidFill>
+            <a:schemeClr val="bg1"/>
+          </a:solidFill>
+        </p:spPr>
+        <p:txBody>
+          <a:bodyPr wrap="none" rtlCol="0">
+            <a:spAutoFit/>
+          </a:bodyPr>
+          <a:lstStyle/>
+          <a:p>
+            <a:r>
+              <a:rPr lang="en-GB" dirty="0" smtClean="0"/>
+              <a:t>Corrected magnetic form factor</a:t>
+            </a:r>
+            <a:endParaRPr lang="en-GB" dirty="0"/>
+          </a:p>
+        </p:txBody>
+      </p:sp>
+      <p:sp>
+        <p:nvSpPr>
+          <p:cNvPr id="8" name="TextBox 7"/>
+          <p:cNvSpPr txBox="1"/>
+          <p:nvPr/>
+        </p:nvSpPr>
+        <p:spPr>
+          <a:xfrm>
+            <a:off x="5702968" y="5799221"/>
+            <a:ext cx="3876574" cy="369332"/>
+          </a:xfrm>
+          <a:prstGeom prst="rect">
+            <a:avLst/>
+          </a:prstGeom>
+          <a:noFill/>
+        </p:spPr>
+        <p:txBody>
+          <a:bodyPr wrap="none" rtlCol="0">
+            <a:spAutoFit/>
+          </a:bodyPr>
+          <a:lstStyle/>
+          <a:p>
+            <a:r>
+              <a:rPr lang="en-GB" dirty="0" smtClean="0"/>
+              <a:t>Fitting parameters: </a:t>
+            </a:r>
+            <a:r>
+              <a:rPr lang="en-GB" b="1" dirty="0"/>
+              <a:t>0.468004 </a:t>
+            </a:r>
+            <a:r>
+              <a:rPr lang="en-GB" b="1" dirty="0" smtClean="0"/>
+              <a:t>0.015127</a:t>
+            </a:r>
+            <a:r>
+              <a:rPr lang="en-GB" dirty="0" smtClean="0"/>
+              <a:t> </a:t>
+            </a:r>
+            <a:endParaRPr lang="en-GB" dirty="0"/>
+          </a:p>
+        </p:txBody>
+      </p:sp>
+    </p:spTree>
+    <p:extLst>
+      <p:ext uri="{BB962C8B-B14F-4D97-AF65-F5344CB8AC3E}">
+        <p14:creationId xmlns:p14="http://schemas.microsoft.com/office/powerpoint/2010/main" val="24320326"/>
+      </p:ext>
+    </p:extLst>
+  </p:cSld>
+  <p:clrMapOvr>
+    <a:masterClrMapping/>
+  </p:clrMapOvr>
+</p:sld>
+</file>
+
+<file path=ppt/slides/slide5.xml><?xml version="1.0" encoding="utf-8"?>
+<p:sld xmlns:a="http://schemas.openxmlformats.org/drawingml/2006/main" xmlns:r="http://schemas.openxmlformats.org/officeDocument/2006/relationships" xmlns:p="http://schemas.openxmlformats.org/presentationml/2006/main">
+  <p:cSld>
+    <p:spTree>
+      <p:nvGrpSpPr>
+        <p:cNvPr id="1" name=""/>
+        <p:cNvGrpSpPr/>
+        <p:nvPr/>
+      </p:nvGrpSpPr>
+      <p:grpSpPr>
+        <a:xfrm>
+          <a:off x="0" y="0"/>
+          <a:ext cx="0" cy="0"/>
+          <a:chOff x="0" y="0"/>
+          <a:chExt cx="0" cy="0"/>
+        </a:xfrm>
+      </p:grpSpPr>
+      <p:sp>
+        <p:nvSpPr>
+          <p:cNvPr id="4" name="Rectangle 3"/>
+          <p:cNvSpPr/>
+          <p:nvPr/>
+        </p:nvSpPr>
+        <p:spPr>
+          <a:xfrm>
+            <a:off x="689811" y="302477"/>
+            <a:ext cx="6096000" cy="646331"/>
+          </a:xfrm>
+          <a:prstGeom prst="rect">
+            <a:avLst/>
+          </a:prstGeom>
+        </p:spPr>
+        <p:txBody>
+          <a:bodyPr>
+            <a:spAutoFit/>
+          </a:bodyPr>
+          <a:lstStyle/>
+          <a:p>
+            <a:r>
+              <a:rPr lang="en-GB" dirty="0" smtClean="0"/>
+              <a:t>Background2 (</a:t>
+            </a:r>
+            <a:r>
+              <a:rPr lang="en-GB" b="1" dirty="0" err="1" smtClean="0"/>
+              <a:t>average_cut</a:t>
+            </a:r>
+            <a:r>
+              <a:rPr lang="en-GB" b="1" dirty="0" smtClean="0"/>
+              <a:t>)</a:t>
+            </a:r>
+            <a:r>
+              <a:rPr lang="en-GB" dirty="0" smtClean="0"/>
+              <a:t>:</a:t>
+            </a:r>
+            <a:br>
+              <a:rPr lang="en-GB" dirty="0" smtClean="0"/>
+            </a:br>
+            <a:endParaRPr lang="en-GB" dirty="0"/>
+          </a:p>
+        </p:txBody>
+      </p:sp>
+      <p:pic>
+        <p:nvPicPr>
+          <p:cNvPr id="5" name="Picture 4"/>
+          <p:cNvPicPr>
+            <a:picLocks noChangeAspect="1"/>
+          </p:cNvPicPr>
+          <p:nvPr/>
+        </p:nvPicPr>
+        <p:blipFill>
+          <a:blip r:embed="rId2"/>
+          <a:stretch>
+            <a:fillRect/>
+          </a:stretch>
+        </p:blipFill>
+        <p:spPr>
+          <a:xfrm>
+            <a:off x="553453" y="1452813"/>
+            <a:ext cx="5334000" cy="4000500"/>
+          </a:xfrm>
+          <a:prstGeom prst="rect">
+            <a:avLst/>
+          </a:prstGeom>
+        </p:spPr>
+      </p:pic>
+      <p:pic>
+        <p:nvPicPr>
+          <p:cNvPr id="6" name="Picture 5"/>
+          <p:cNvPicPr>
+            <a:picLocks noChangeAspect="1"/>
+          </p:cNvPicPr>
+          <p:nvPr/>
+        </p:nvPicPr>
+        <p:blipFill>
+          <a:blip r:embed="rId3"/>
+          <a:stretch>
+            <a:fillRect/>
+          </a:stretch>
+        </p:blipFill>
+        <p:spPr>
+          <a:xfrm>
+            <a:off x="5887453" y="1452813"/>
+            <a:ext cx="5334000" cy="4000500"/>
           </a:xfrm>
           <a:prstGeom prst="rect">
             <a:avLst/>
@@ -3578,7 +3888,717 @@
     </p:spTree>
     <p:extLst>
       <p:ext uri="{BB962C8B-B14F-4D97-AF65-F5344CB8AC3E}">
-        <p14:creationId xmlns:p14="http://schemas.microsoft.com/office/powerpoint/2010/main" val="24320326"/>
+        <p14:creationId xmlns:p14="http://schemas.microsoft.com/office/powerpoint/2010/main" val="4264760487"/>
+      </p:ext>
+    </p:extLst>
+  </p:cSld>
+  <p:clrMapOvr>
+    <a:masterClrMapping/>
+  </p:clrMapOvr>
+</p:sld>
+</file>
+
+<file path=ppt/slides/slide6.xml><?xml version="1.0" encoding="utf-8"?>
+<p:sld xmlns:a="http://schemas.openxmlformats.org/drawingml/2006/main" xmlns:r="http://schemas.openxmlformats.org/officeDocument/2006/relationships" xmlns:p="http://schemas.openxmlformats.org/presentationml/2006/main">
+  <p:cSld>
+    <p:spTree>
+      <p:nvGrpSpPr>
+        <p:cNvPr id="1" name=""/>
+        <p:cNvGrpSpPr/>
+        <p:nvPr/>
+      </p:nvGrpSpPr>
+      <p:grpSpPr>
+        <a:xfrm>
+          <a:off x="0" y="0"/>
+          <a:ext cx="0" cy="0"/>
+          <a:chOff x="0" y="0"/>
+          <a:chExt cx="0" cy="0"/>
+        </a:xfrm>
+      </p:grpSpPr>
+      <p:sp>
+        <p:nvSpPr>
+          <p:cNvPr id="2" name="Title 1"/>
+          <p:cNvSpPr>
+            <a:spLocks noGrp="1"/>
+          </p:cNvSpPr>
+          <p:nvPr>
+            <p:ph type="title"/>
+          </p:nvPr>
+        </p:nvSpPr>
+        <p:spPr>
+          <a:xfrm>
+            <a:off x="802105" y="1"/>
+            <a:ext cx="10515600" cy="866274"/>
+          </a:xfrm>
+        </p:spPr>
+        <p:txBody>
+          <a:bodyPr>
+            <a:normAutofit/>
+          </a:bodyPr>
+          <a:lstStyle/>
+          <a:p>
+            <a:r>
+              <a:rPr lang="en-GB" sz="2400" dirty="0" smtClean="0"/>
+              <a:t>Partial cuts:</a:t>
+            </a:r>
+            <a:endParaRPr lang="en-GB" sz="2400" dirty="0"/>
+          </a:p>
+        </p:txBody>
+      </p:sp>
+      <p:pic>
+        <p:nvPicPr>
+          <p:cNvPr id="3" name="Picture 2"/>
+          <p:cNvPicPr>
+            <a:picLocks/>
+          </p:cNvPicPr>
+          <p:nvPr/>
+        </p:nvPicPr>
+        <p:blipFill>
+          <a:blip r:embed="rId2"/>
+          <a:stretch>
+            <a:fillRect/>
+          </a:stretch>
+        </p:blipFill>
+        <p:spPr>
+          <a:xfrm>
+            <a:off x="433908" y="718887"/>
+            <a:ext cx="2880000" cy="2520000"/>
+          </a:xfrm>
+          <a:prstGeom prst="rect">
+            <a:avLst/>
+          </a:prstGeom>
+        </p:spPr>
+      </p:pic>
+      <p:pic>
+        <p:nvPicPr>
+          <p:cNvPr id="5" name="Picture 4"/>
+          <p:cNvPicPr>
+            <a:picLocks/>
+          </p:cNvPicPr>
+          <p:nvPr/>
+        </p:nvPicPr>
+        <p:blipFill>
+          <a:blip r:embed="rId3"/>
+          <a:stretch>
+            <a:fillRect/>
+          </a:stretch>
+        </p:blipFill>
+        <p:spPr>
+          <a:xfrm>
+            <a:off x="3179905" y="718887"/>
+            <a:ext cx="2880000" cy="2520000"/>
+          </a:xfrm>
+          <a:prstGeom prst="rect">
+            <a:avLst/>
+          </a:prstGeom>
+        </p:spPr>
+      </p:pic>
+      <p:pic>
+        <p:nvPicPr>
+          <p:cNvPr id="7" name="Picture 6"/>
+          <p:cNvPicPr>
+            <a:picLocks/>
+          </p:cNvPicPr>
+          <p:nvPr/>
+        </p:nvPicPr>
+        <p:blipFill>
+          <a:blip r:embed="rId4"/>
+          <a:stretch>
+            <a:fillRect/>
+          </a:stretch>
+        </p:blipFill>
+        <p:spPr>
+          <a:xfrm>
+            <a:off x="332760" y="3597773"/>
+            <a:ext cx="2880000" cy="2520000"/>
+          </a:xfrm>
+          <a:prstGeom prst="rect">
+            <a:avLst/>
+          </a:prstGeom>
+        </p:spPr>
+      </p:pic>
+      <p:pic>
+        <p:nvPicPr>
+          <p:cNvPr id="8" name="Picture 7"/>
+          <p:cNvPicPr>
+            <a:picLocks/>
+          </p:cNvPicPr>
+          <p:nvPr/>
+        </p:nvPicPr>
+        <p:blipFill>
+          <a:blip r:embed="rId5"/>
+          <a:stretch>
+            <a:fillRect/>
+          </a:stretch>
+        </p:blipFill>
+        <p:spPr>
+          <a:xfrm>
+            <a:off x="3313908" y="3597773"/>
+            <a:ext cx="2880000" cy="2520000"/>
+          </a:xfrm>
+          <a:prstGeom prst="rect">
+            <a:avLst/>
+          </a:prstGeom>
+        </p:spPr>
+      </p:pic>
+      <p:pic>
+        <p:nvPicPr>
+          <p:cNvPr id="9" name="Picture 8"/>
+          <p:cNvPicPr>
+            <a:picLocks/>
+          </p:cNvPicPr>
+          <p:nvPr/>
+        </p:nvPicPr>
+        <p:blipFill>
+          <a:blip r:embed="rId6"/>
+          <a:stretch>
+            <a:fillRect/>
+          </a:stretch>
+        </p:blipFill>
+        <p:spPr>
+          <a:xfrm>
+            <a:off x="6295056" y="716324"/>
+            <a:ext cx="2880000" cy="2520000"/>
+          </a:xfrm>
+          <a:prstGeom prst="rect">
+            <a:avLst/>
+          </a:prstGeom>
+        </p:spPr>
+      </p:pic>
+      <p:pic>
+        <p:nvPicPr>
+          <p:cNvPr id="16" name="Picture 15"/>
+          <p:cNvPicPr>
+            <a:picLocks/>
+          </p:cNvPicPr>
+          <p:nvPr/>
+        </p:nvPicPr>
+        <p:blipFill>
+          <a:blip r:embed="rId7"/>
+          <a:stretch>
+            <a:fillRect/>
+          </a:stretch>
+        </p:blipFill>
+        <p:spPr>
+          <a:xfrm>
+            <a:off x="9175056" y="718887"/>
+            <a:ext cx="2880000" cy="2520000"/>
+          </a:xfrm>
+          <a:prstGeom prst="rect">
+            <a:avLst/>
+          </a:prstGeom>
+        </p:spPr>
+      </p:pic>
+      <p:pic>
+        <p:nvPicPr>
+          <p:cNvPr id="17" name="Picture 16"/>
+          <p:cNvPicPr>
+            <a:picLocks/>
+          </p:cNvPicPr>
+          <p:nvPr/>
+        </p:nvPicPr>
+        <p:blipFill>
+          <a:blip r:embed="rId8"/>
+          <a:stretch>
+            <a:fillRect/>
+          </a:stretch>
+        </p:blipFill>
+        <p:spPr>
+          <a:xfrm>
+            <a:off x="6295056" y="3597773"/>
+            <a:ext cx="2880000" cy="2520000"/>
+          </a:xfrm>
+          <a:prstGeom prst="rect">
+            <a:avLst/>
+          </a:prstGeom>
+        </p:spPr>
+      </p:pic>
+      <p:pic>
+        <p:nvPicPr>
+          <p:cNvPr id="18" name="Picture 17"/>
+          <p:cNvPicPr>
+            <a:picLocks/>
+          </p:cNvPicPr>
+          <p:nvPr/>
+        </p:nvPicPr>
+        <p:blipFill>
+          <a:blip r:embed="rId9"/>
+          <a:stretch>
+            <a:fillRect/>
+          </a:stretch>
+        </p:blipFill>
+        <p:spPr>
+          <a:xfrm>
+            <a:off x="9276204" y="3597773"/>
+            <a:ext cx="2880000" cy="2520000"/>
+          </a:xfrm>
+          <a:prstGeom prst="rect">
+            <a:avLst/>
+          </a:prstGeom>
+        </p:spPr>
+      </p:pic>
+    </p:spTree>
+    <p:extLst>
+      <p:ext uri="{BB962C8B-B14F-4D97-AF65-F5344CB8AC3E}">
+        <p14:creationId xmlns:p14="http://schemas.microsoft.com/office/powerpoint/2010/main" val="4061405861"/>
+      </p:ext>
+    </p:extLst>
+  </p:cSld>
+  <p:clrMapOvr>
+    <a:masterClrMapping/>
+  </p:clrMapOvr>
+</p:sld>
+</file>
+
+<file path=ppt/slides/slide7.xml><?xml version="1.0" encoding="utf-8"?>
+<p:sld xmlns:a="http://schemas.openxmlformats.org/drawingml/2006/main" xmlns:r="http://schemas.openxmlformats.org/officeDocument/2006/relationships" xmlns:p="http://schemas.openxmlformats.org/presentationml/2006/main">
+  <p:cSld>
+    <p:spTree>
+      <p:nvGrpSpPr>
+        <p:cNvPr id="1" name=""/>
+        <p:cNvGrpSpPr/>
+        <p:nvPr/>
+      </p:nvGrpSpPr>
+      <p:grpSpPr>
+        <a:xfrm>
+          <a:off x="0" y="0"/>
+          <a:ext cx="0" cy="0"/>
+          <a:chOff x="0" y="0"/>
+          <a:chExt cx="0" cy="0"/>
+        </a:xfrm>
+      </p:grpSpPr>
+      <p:sp>
+        <p:nvSpPr>
+          <p:cNvPr id="2" name="Title 1"/>
+          <p:cNvSpPr>
+            <a:spLocks noGrp="1"/>
+          </p:cNvSpPr>
+          <p:nvPr>
+            <p:ph type="title"/>
+          </p:nvPr>
+        </p:nvSpPr>
+        <p:spPr>
+          <a:xfrm>
+            <a:off x="1792705" y="0"/>
+            <a:ext cx="9416716" cy="1325563"/>
+          </a:xfrm>
+        </p:spPr>
+        <p:txBody>
+          <a:bodyPr>
+            <a:normAutofit/>
+          </a:bodyPr>
+          <a:lstStyle/>
+          <a:p>
+            <a:r>
+              <a:rPr lang="en-GB" sz="3100" dirty="0" err="1" smtClean="0"/>
+              <a:t>sym_cut</a:t>
+            </a:r>
+            <a:r>
+              <a:rPr lang="en-GB" sz="3100" dirty="0" smtClean="0"/>
+              <a:t> with </a:t>
+            </a:r>
+            <a:r>
+              <a:rPr lang="en-GB" sz="3200" dirty="0" smtClean="0"/>
+              <a:t>Background2 (</a:t>
+            </a:r>
+            <a:r>
+              <a:rPr lang="en-GB" sz="3200" b="1" dirty="0" err="1" smtClean="0"/>
+              <a:t>average_cut</a:t>
+            </a:r>
+            <a:r>
+              <a:rPr lang="en-GB" sz="3200" b="1" dirty="0" smtClean="0"/>
+              <a:t>)</a:t>
+            </a:r>
+            <a:r>
+              <a:rPr lang="en-GB" sz="3200" dirty="0" smtClean="0"/>
+              <a:t>:</a:t>
+            </a:r>
+            <a:endParaRPr lang="en-GB" dirty="0"/>
+          </a:p>
+        </p:txBody>
+      </p:sp>
+      <p:pic>
+        <p:nvPicPr>
+          <p:cNvPr id="3" name="Picture 2"/>
+          <p:cNvPicPr>
+            <a:picLocks noChangeAspect="1"/>
+          </p:cNvPicPr>
+          <p:nvPr/>
+        </p:nvPicPr>
+        <p:blipFill>
+          <a:blip r:embed="rId2"/>
+          <a:stretch>
+            <a:fillRect/>
+          </a:stretch>
+        </p:blipFill>
+        <p:spPr>
+          <a:xfrm>
+            <a:off x="180466" y="1428750"/>
+            <a:ext cx="5334000" cy="4000500"/>
+          </a:xfrm>
+          <a:prstGeom prst="rect">
+            <a:avLst/>
+          </a:prstGeom>
+        </p:spPr>
+      </p:pic>
+      <p:pic>
+        <p:nvPicPr>
+          <p:cNvPr id="9" name="Picture 8"/>
+          <p:cNvPicPr>
+            <a:picLocks noChangeAspect="1"/>
+          </p:cNvPicPr>
+          <p:nvPr/>
+        </p:nvPicPr>
+        <p:blipFill>
+          <a:blip r:embed="rId3"/>
+          <a:stretch>
+            <a:fillRect/>
+          </a:stretch>
+        </p:blipFill>
+        <p:spPr>
+          <a:xfrm>
+            <a:off x="5678911" y="1440782"/>
+            <a:ext cx="5334000" cy="4000500"/>
+          </a:xfrm>
+          <a:prstGeom prst="rect">
+            <a:avLst/>
+          </a:prstGeom>
+        </p:spPr>
+      </p:pic>
+      <p:sp>
+        <p:nvSpPr>
+          <p:cNvPr id="10" name="TextBox 9"/>
+          <p:cNvSpPr txBox="1"/>
+          <p:nvPr/>
+        </p:nvSpPr>
+        <p:spPr>
+          <a:xfrm>
+            <a:off x="2382252" y="5859379"/>
+            <a:ext cx="4235115" cy="369332"/>
+          </a:xfrm>
+          <a:prstGeom prst="rect">
+            <a:avLst/>
+          </a:prstGeom>
+          <a:noFill/>
+        </p:spPr>
+        <p:txBody>
+          <a:bodyPr wrap="square" rtlCol="0">
+            <a:spAutoFit/>
+          </a:bodyPr>
+          <a:lstStyle/>
+          <a:p>
+            <a:r>
+              <a:rPr lang="en-GB" dirty="0" smtClean="0"/>
+              <a:t>Fitting parameters: </a:t>
+            </a:r>
+            <a:r>
+              <a:rPr lang="en-GB" b="1" dirty="0"/>
+              <a:t>[0.437546 </a:t>
+            </a:r>
+            <a:r>
+              <a:rPr lang="en-GB" b="1" dirty="0" smtClean="0"/>
+              <a:t>0.014128</a:t>
+            </a:r>
+            <a:r>
+              <a:rPr lang="en-GB" dirty="0" smtClean="0"/>
+              <a:t>]</a:t>
+            </a:r>
+            <a:endParaRPr lang="en-GB" dirty="0"/>
+          </a:p>
+        </p:txBody>
+      </p:sp>
+    </p:spTree>
+    <p:extLst>
+      <p:ext uri="{BB962C8B-B14F-4D97-AF65-F5344CB8AC3E}">
+        <p14:creationId xmlns:p14="http://schemas.microsoft.com/office/powerpoint/2010/main" val="2469319558"/>
+      </p:ext>
+    </p:extLst>
+  </p:cSld>
+  <p:clrMapOvr>
+    <a:masterClrMapping/>
+  </p:clrMapOvr>
+</p:sld>
+</file>
+
+<file path=ppt/slides/slide8.xml><?xml version="1.0" encoding="utf-8"?>
+<p:sld xmlns:a="http://schemas.openxmlformats.org/drawingml/2006/main" xmlns:r="http://schemas.openxmlformats.org/officeDocument/2006/relationships" xmlns:p="http://schemas.openxmlformats.org/presentationml/2006/main">
+  <p:cSld>
+    <p:spTree>
+      <p:nvGrpSpPr>
+        <p:cNvPr id="1" name=""/>
+        <p:cNvGrpSpPr/>
+        <p:nvPr/>
+      </p:nvGrpSpPr>
+      <p:grpSpPr>
+        <a:xfrm>
+          <a:off x="0" y="0"/>
+          <a:ext cx="0" cy="0"/>
+          <a:chOff x="0" y="0"/>
+          <a:chExt cx="0" cy="0"/>
+        </a:xfrm>
+      </p:grpSpPr>
+      <p:sp>
+        <p:nvSpPr>
+          <p:cNvPr id="4" name="Rectangle 3"/>
+          <p:cNvSpPr/>
+          <p:nvPr/>
+        </p:nvSpPr>
+        <p:spPr>
+          <a:xfrm>
+            <a:off x="689811" y="302477"/>
+            <a:ext cx="6096000" cy="923330"/>
+          </a:xfrm>
+          <a:prstGeom prst="rect">
+            <a:avLst/>
+          </a:prstGeom>
+        </p:spPr>
+        <p:txBody>
+          <a:bodyPr>
+            <a:spAutoFit/>
+          </a:bodyPr>
+          <a:lstStyle/>
+          <a:p>
+            <a:r>
+              <a:rPr lang="en-GB" dirty="0" smtClean="0"/>
+              <a:t>Background3 (</a:t>
+            </a:r>
+            <a:r>
+              <a:rPr lang="en-GB" dirty="0" err="1" smtClean="0"/>
+              <a:t>remote</a:t>
+            </a:r>
+            <a:r>
+              <a:rPr lang="en-GB" b="1" dirty="0" err="1" smtClean="0"/>
+              <a:t>_cut</a:t>
+            </a:r>
+            <a:r>
+              <a:rPr lang="en-GB" b="1" dirty="0" smtClean="0"/>
+              <a:t>)</a:t>
+            </a:r>
+            <a:r>
+              <a:rPr lang="en-GB" dirty="0" smtClean="0"/>
+              <a:t>: Overcompensation. Ideas for high energy backgroun</a:t>
+            </a:r>
+            <a:r>
+              <a:rPr lang="en-GB" dirty="0" smtClean="0"/>
+              <a:t>d removal.</a:t>
+            </a:r>
+            <a:r>
+              <a:rPr lang="en-GB" dirty="0" smtClean="0"/>
+              <a:t/>
+            </a:r>
+            <a:br>
+              <a:rPr lang="en-GB" dirty="0" smtClean="0"/>
+            </a:br>
+            <a:endParaRPr lang="en-GB" dirty="0"/>
+          </a:p>
+        </p:txBody>
+      </p:sp>
+      <p:pic>
+        <p:nvPicPr>
+          <p:cNvPr id="2" name="Picture 1"/>
+          <p:cNvPicPr>
+            <a:picLocks noChangeAspect="1"/>
+          </p:cNvPicPr>
+          <p:nvPr/>
+        </p:nvPicPr>
+        <p:blipFill>
+          <a:blip r:embed="rId2"/>
+          <a:stretch>
+            <a:fillRect/>
+          </a:stretch>
+        </p:blipFill>
+        <p:spPr>
+          <a:xfrm>
+            <a:off x="324853" y="1452813"/>
+            <a:ext cx="5334000" cy="4000500"/>
+          </a:xfrm>
+          <a:prstGeom prst="rect">
+            <a:avLst/>
+          </a:prstGeom>
+        </p:spPr>
+      </p:pic>
+      <p:pic>
+        <p:nvPicPr>
+          <p:cNvPr id="3" name="Picture 2"/>
+          <p:cNvPicPr>
+            <a:picLocks noChangeAspect="1"/>
+          </p:cNvPicPr>
+          <p:nvPr/>
+        </p:nvPicPr>
+        <p:blipFill>
+          <a:blip r:embed="rId3"/>
+          <a:stretch>
+            <a:fillRect/>
+          </a:stretch>
+        </p:blipFill>
+        <p:spPr>
+          <a:xfrm>
+            <a:off x="6328611" y="1452813"/>
+            <a:ext cx="5334000" cy="4000500"/>
+          </a:xfrm>
+          <a:prstGeom prst="rect">
+            <a:avLst/>
+          </a:prstGeom>
+        </p:spPr>
+      </p:pic>
+      <p:sp>
+        <p:nvSpPr>
+          <p:cNvPr id="8" name="TextBox 7"/>
+          <p:cNvSpPr txBox="1"/>
+          <p:nvPr/>
+        </p:nvSpPr>
+        <p:spPr>
+          <a:xfrm>
+            <a:off x="689811" y="5859379"/>
+            <a:ext cx="8586536" cy="369332"/>
+          </a:xfrm>
+          <a:prstGeom prst="rect">
+            <a:avLst/>
+          </a:prstGeom>
+          <a:noFill/>
+        </p:spPr>
+        <p:txBody>
+          <a:bodyPr wrap="square" rtlCol="0">
+            <a:spAutoFit/>
+          </a:bodyPr>
+          <a:lstStyle/>
+          <a:p>
+            <a:r>
+              <a:rPr lang="en-GB" dirty="0" smtClean="0"/>
+              <a:t>Fitting parameters: </a:t>
+            </a:r>
+            <a:r>
+              <a:rPr lang="en-GB" b="1" dirty="0" smtClean="0"/>
+              <a:t>[</a:t>
+            </a:r>
+            <a:r>
+              <a:rPr lang="en-GB" b="1" dirty="0"/>
+              <a:t>0.437546 </a:t>
+            </a:r>
+            <a:r>
+              <a:rPr lang="en-GB" b="1" dirty="0" smtClean="0"/>
+              <a:t>0.014128</a:t>
+            </a:r>
+            <a:r>
+              <a:rPr lang="en-GB" dirty="0" smtClean="0"/>
+              <a:t>]; Overcompensation</a:t>
+            </a:r>
+            <a:endParaRPr lang="en-GB" dirty="0"/>
+          </a:p>
+        </p:txBody>
+      </p:sp>
+    </p:spTree>
+    <p:extLst>
+      <p:ext uri="{BB962C8B-B14F-4D97-AF65-F5344CB8AC3E}">
+        <p14:creationId xmlns:p14="http://schemas.microsoft.com/office/powerpoint/2010/main" val="2444435092"/>
+      </p:ext>
+    </p:extLst>
+  </p:cSld>
+  <p:clrMapOvr>
+    <a:masterClrMapping/>
+  </p:clrMapOvr>
+</p:sld>
+</file>
+
+<file path=ppt/slides/slide9.xml><?xml version="1.0" encoding="utf-8"?>
+<p:sld xmlns:a="http://schemas.openxmlformats.org/drawingml/2006/main" xmlns:r="http://schemas.openxmlformats.org/officeDocument/2006/relationships" xmlns:p="http://schemas.openxmlformats.org/presentationml/2006/main">
+  <p:cSld>
+    <p:spTree>
+      <p:nvGrpSpPr>
+        <p:cNvPr id="1" name=""/>
+        <p:cNvGrpSpPr/>
+        <p:nvPr/>
+      </p:nvGrpSpPr>
+      <p:grpSpPr>
+        <a:xfrm>
+          <a:off x="0" y="0"/>
+          <a:ext cx="0" cy="0"/>
+          <a:chOff x="0" y="0"/>
+          <a:chExt cx="0" cy="0"/>
+        </a:xfrm>
+      </p:grpSpPr>
+      <p:sp>
+        <p:nvSpPr>
+          <p:cNvPr id="2" name="Title 1"/>
+          <p:cNvSpPr>
+            <a:spLocks noGrp="1"/>
+          </p:cNvSpPr>
+          <p:nvPr>
+            <p:ph type="title"/>
+          </p:nvPr>
+        </p:nvSpPr>
+        <p:spPr/>
+        <p:txBody>
+          <a:bodyPr/>
+          <a:lstStyle/>
+          <a:p>
+            <a:r>
+              <a:rPr lang="en-GB" dirty="0" smtClean="0"/>
+              <a:t>Summary: All backgrounds are good enough. </a:t>
+            </a:r>
+            <a:br>
+              <a:rPr lang="en-GB" dirty="0" smtClean="0"/>
+            </a:br>
+            <a:r>
+              <a:rPr lang="en-GB" dirty="0" smtClean="0"/>
+              <a:t>What about high energy range?</a:t>
+            </a:r>
+            <a:endParaRPr lang="en-GB" dirty="0"/>
+          </a:p>
+        </p:txBody>
+      </p:sp>
+      <p:pic>
+        <p:nvPicPr>
+          <p:cNvPr id="4" name="Picture 3"/>
+          <p:cNvPicPr>
+            <a:picLocks/>
+          </p:cNvPicPr>
+          <p:nvPr/>
+        </p:nvPicPr>
+        <p:blipFill>
+          <a:blip r:embed="rId2"/>
+          <a:stretch>
+            <a:fillRect/>
+          </a:stretch>
+        </p:blipFill>
+        <p:spPr>
+          <a:xfrm>
+            <a:off x="6313800" y="2087730"/>
+            <a:ext cx="5040000" cy="3960000"/>
+          </a:xfrm>
+          <a:prstGeom prst="rect">
+            <a:avLst/>
+          </a:prstGeom>
+        </p:spPr>
+      </p:pic>
+      <p:pic>
+        <p:nvPicPr>
+          <p:cNvPr id="5" name="Picture 4"/>
+          <p:cNvPicPr>
+            <a:picLocks/>
+          </p:cNvPicPr>
+          <p:nvPr/>
+        </p:nvPicPr>
+        <p:blipFill>
+          <a:blip r:embed="rId3"/>
+          <a:stretch>
+            <a:fillRect/>
+          </a:stretch>
+        </p:blipFill>
+        <p:spPr>
+          <a:xfrm>
+            <a:off x="838200" y="2232108"/>
+            <a:ext cx="5040000" cy="3960000"/>
+          </a:xfrm>
+          <a:prstGeom prst="rect">
+            <a:avLst/>
+          </a:prstGeom>
+        </p:spPr>
+      </p:pic>
+    </p:spTree>
+    <p:extLst>
+      <p:ext uri="{BB962C8B-B14F-4D97-AF65-F5344CB8AC3E}">
+        <p14:creationId xmlns:p14="http://schemas.microsoft.com/office/powerpoint/2010/main" val="432591689"/>
       </p:ext>
     </p:extLst>
   </p:cSld>

</xml_diff>

<commit_message>
completed analysing for NP direction, high energy transfer
</commit_message>
<xml_diff>
--- a/Article2020/Analysing_NP.pptx
+++ b/Article2020/Analysing_NP.pptx
@@ -6,14 +6,16 @@
   </p:sldMasterIdLst>
   <p:sldIdLst>
     <p:sldId id="256" r:id="rId2"/>
-    <p:sldId id="257" r:id="rId3"/>
-    <p:sldId id="258" r:id="rId4"/>
-    <p:sldId id="259" r:id="rId5"/>
-    <p:sldId id="260" r:id="rId6"/>
-    <p:sldId id="261" r:id="rId7"/>
-    <p:sldId id="262" r:id="rId8"/>
-    <p:sldId id="263" r:id="rId9"/>
-    <p:sldId id="264" r:id="rId10"/>
+    <p:sldId id="265" r:id="rId3"/>
+    <p:sldId id="257" r:id="rId4"/>
+    <p:sldId id="258" r:id="rId5"/>
+    <p:sldId id="259" r:id="rId6"/>
+    <p:sldId id="260" r:id="rId7"/>
+    <p:sldId id="261" r:id="rId8"/>
+    <p:sldId id="262" r:id="rId9"/>
+    <p:sldId id="263" r:id="rId10"/>
+    <p:sldId id="264" r:id="rId11"/>
+    <p:sldId id="266" r:id="rId12"/>
   </p:sldIdLst>
   <p:sldSz cx="12192000" cy="6858000"/>
   <p:notesSz cx="6858000" cy="9144000"/>
@@ -112,6 +114,11 @@
       </a:defRPr>
     </a:lvl9pPr>
   </p:defaultTextStyle>
+  <p:extLst>
+    <p:ext uri="{EFAFB233-063F-42B5-8137-9DF3F51BA10A}">
+      <p15:sldGuideLst xmlns:p15="http://schemas.microsoft.com/office/powerpoint/2012/main"/>
+    </p:ext>
+  </p:extLst>
 </p:presentation>
 </file>
 
@@ -246,7 +253,7 @@
           <a:p>
             <a:fld id="{C5E1428C-A172-4443-8EA4-B629A031C1C0}" type="datetimeFigureOut">
               <a:rPr lang="en-GB" smtClean="0"/>
-              <a:t>14/10/2020</a:t>
+              <a:t>30/10/2020</a:t>
             </a:fld>
             <a:endParaRPr lang="en-GB"/>
           </a:p>
@@ -416,7 +423,7 @@
           <a:p>
             <a:fld id="{C5E1428C-A172-4443-8EA4-B629A031C1C0}" type="datetimeFigureOut">
               <a:rPr lang="en-GB" smtClean="0"/>
-              <a:t>14/10/2020</a:t>
+              <a:t>30/10/2020</a:t>
             </a:fld>
             <a:endParaRPr lang="en-GB"/>
           </a:p>
@@ -596,7 +603,7 @@
           <a:p>
             <a:fld id="{C5E1428C-A172-4443-8EA4-B629A031C1C0}" type="datetimeFigureOut">
               <a:rPr lang="en-GB" smtClean="0"/>
-              <a:t>14/10/2020</a:t>
+              <a:t>30/10/2020</a:t>
             </a:fld>
             <a:endParaRPr lang="en-GB"/>
           </a:p>
@@ -766,7 +773,7 @@
           <a:p>
             <a:fld id="{C5E1428C-A172-4443-8EA4-B629A031C1C0}" type="datetimeFigureOut">
               <a:rPr lang="en-GB" smtClean="0"/>
-              <a:t>14/10/2020</a:t>
+              <a:t>30/10/2020</a:t>
             </a:fld>
             <a:endParaRPr lang="en-GB"/>
           </a:p>
@@ -1012,7 +1019,7 @@
           <a:p>
             <a:fld id="{C5E1428C-A172-4443-8EA4-B629A031C1C0}" type="datetimeFigureOut">
               <a:rPr lang="en-GB" smtClean="0"/>
-              <a:t>14/10/2020</a:t>
+              <a:t>30/10/2020</a:t>
             </a:fld>
             <a:endParaRPr lang="en-GB"/>
           </a:p>
@@ -1244,7 +1251,7 @@
           <a:p>
             <a:fld id="{C5E1428C-A172-4443-8EA4-B629A031C1C0}" type="datetimeFigureOut">
               <a:rPr lang="en-GB" smtClean="0"/>
-              <a:t>14/10/2020</a:t>
+              <a:t>30/10/2020</a:t>
             </a:fld>
             <a:endParaRPr lang="en-GB"/>
           </a:p>
@@ -1611,7 +1618,7 @@
           <a:p>
             <a:fld id="{C5E1428C-A172-4443-8EA4-B629A031C1C0}" type="datetimeFigureOut">
               <a:rPr lang="en-GB" smtClean="0"/>
-              <a:t>14/10/2020</a:t>
+              <a:t>30/10/2020</a:t>
             </a:fld>
             <a:endParaRPr lang="en-GB"/>
           </a:p>
@@ -1729,7 +1736,7 @@
           <a:p>
             <a:fld id="{C5E1428C-A172-4443-8EA4-B629A031C1C0}" type="datetimeFigureOut">
               <a:rPr lang="en-GB" smtClean="0"/>
-              <a:t>14/10/2020</a:t>
+              <a:t>30/10/2020</a:t>
             </a:fld>
             <a:endParaRPr lang="en-GB"/>
           </a:p>
@@ -1824,7 +1831,7 @@
           <a:p>
             <a:fld id="{C5E1428C-A172-4443-8EA4-B629A031C1C0}" type="datetimeFigureOut">
               <a:rPr lang="en-GB" smtClean="0"/>
-              <a:t>14/10/2020</a:t>
+              <a:t>30/10/2020</a:t>
             </a:fld>
             <a:endParaRPr lang="en-GB"/>
           </a:p>
@@ -2101,7 +2108,7 @@
           <a:p>
             <a:fld id="{C5E1428C-A172-4443-8EA4-B629A031C1C0}" type="datetimeFigureOut">
               <a:rPr lang="en-GB" smtClean="0"/>
-              <a:t>14/10/2020</a:t>
+              <a:t>30/10/2020</a:t>
             </a:fld>
             <a:endParaRPr lang="en-GB"/>
           </a:p>
@@ -2354,7 +2361,7 @@
           <a:p>
             <a:fld id="{C5E1428C-A172-4443-8EA4-B629A031C1C0}" type="datetimeFigureOut">
               <a:rPr lang="en-GB" smtClean="0"/>
-              <a:t>14/10/2020</a:t>
+              <a:t>30/10/2020</a:t>
             </a:fld>
             <a:endParaRPr lang="en-GB"/>
           </a:p>
@@ -2567,7 +2574,7 @@
           <a:p>
             <a:fld id="{C5E1428C-A172-4443-8EA4-B629A031C1C0}" type="datetimeFigureOut">
               <a:rPr lang="en-GB" smtClean="0"/>
-              <a:t>14/10/2020</a:t>
+              <a:t>30/10/2020</a:t>
             </a:fld>
             <a:endParaRPr lang="en-GB"/>
           </a:p>
@@ -3035,7 +3042,7 @@
         </p:blipFill>
         <p:spPr>
           <a:xfrm>
-            <a:off x="529197" y="1673041"/>
+            <a:off x="529197" y="1641118"/>
             <a:ext cx="5238214" cy="4763001"/>
           </a:xfrm>
           <a:prstGeom prst="rect">
@@ -3067,10 +3074,451 @@
           </a:prstGeom>
         </p:spPr>
       </p:pic>
+      <p:sp>
+        <p:nvSpPr>
+          <p:cNvPr id="2" name="TextBox 1"/>
+          <p:cNvSpPr txBox="1"/>
+          <p:nvPr/>
+        </p:nvSpPr>
+        <p:spPr>
+          <a:xfrm>
+            <a:off x="6521380" y="994787"/>
+            <a:ext cx="3933128" cy="646331"/>
+          </a:xfrm>
+          <a:prstGeom prst="rect">
+            <a:avLst/>
+          </a:prstGeom>
+          <a:noFill/>
+        </p:spPr>
+        <p:txBody>
+          <a:bodyPr wrap="none" rtlCol="0">
+            <a:spAutoFit/>
+          </a:bodyPr>
+          <a:lstStyle/>
+          <a:p>
+            <a:r>
+              <a:rPr lang="en-GB" dirty="0" smtClean="0"/>
+              <a:t>Locations of the cuts used in analysis:</a:t>
+            </a:r>
+          </a:p>
+          <a:p>
+            <a:r>
+              <a:rPr lang="en-GB" dirty="0" smtClean="0"/>
+              <a:t>(in the image plain and orthogonal to it)</a:t>
+            </a:r>
+            <a:endParaRPr lang="en-GB" dirty="0"/>
+          </a:p>
+        </p:txBody>
+      </p:sp>
+      <p:cxnSp>
+        <p:nvCxnSpPr>
+          <p:cNvPr id="7" name="Straight Arrow Connector 6"/>
+          <p:cNvCxnSpPr/>
+          <p:nvPr/>
+        </p:nvCxnSpPr>
+        <p:spPr>
+          <a:xfrm flipH="1" flipV="1">
+            <a:off x="7579895" y="2550695"/>
+            <a:ext cx="8593" cy="512255"/>
+          </a:xfrm>
+          <a:prstGeom prst="straightConnector1">
+            <a:avLst/>
+          </a:prstGeom>
+          <a:ln w="12700">
+            <a:solidFill>
+              <a:srgbClr val="FF0000"/>
+            </a:solidFill>
+            <a:tailEnd type="triangle"/>
+          </a:ln>
+        </p:spPr>
+        <p:style>
+          <a:lnRef idx="1">
+            <a:schemeClr val="accent1"/>
+          </a:lnRef>
+          <a:fillRef idx="0">
+            <a:schemeClr val="accent1"/>
+          </a:fillRef>
+          <a:effectRef idx="0">
+            <a:schemeClr val="accent1"/>
+          </a:effectRef>
+          <a:fontRef idx="minor">
+            <a:schemeClr val="tx1"/>
+          </a:fontRef>
+        </p:style>
+      </p:cxnSp>
+      <p:cxnSp>
+        <p:nvCxnSpPr>
+          <p:cNvPr id="9" name="Straight Arrow Connector 8"/>
+          <p:cNvCxnSpPr/>
+          <p:nvPr/>
+        </p:nvCxnSpPr>
+        <p:spPr>
+          <a:xfrm flipH="1" flipV="1">
+            <a:off x="7996991" y="2582775"/>
+            <a:ext cx="8593" cy="512255"/>
+          </a:xfrm>
+          <a:prstGeom prst="straightConnector1">
+            <a:avLst/>
+          </a:prstGeom>
+          <a:ln w="12700">
+            <a:solidFill>
+              <a:srgbClr val="FF0000"/>
+            </a:solidFill>
+            <a:tailEnd type="triangle"/>
+          </a:ln>
+        </p:spPr>
+        <p:style>
+          <a:lnRef idx="1">
+            <a:schemeClr val="accent1"/>
+          </a:lnRef>
+          <a:fillRef idx="0">
+            <a:schemeClr val="accent1"/>
+          </a:fillRef>
+          <a:effectRef idx="0">
+            <a:schemeClr val="accent1"/>
+          </a:effectRef>
+          <a:fontRef idx="minor">
+            <a:schemeClr val="tx1"/>
+          </a:fontRef>
+        </p:style>
+      </p:cxnSp>
+      <p:cxnSp>
+        <p:nvCxnSpPr>
+          <p:cNvPr id="10" name="Straight Arrow Connector 9"/>
+          <p:cNvCxnSpPr/>
+          <p:nvPr/>
+        </p:nvCxnSpPr>
+        <p:spPr>
+          <a:xfrm>
+            <a:off x="8710855" y="3744731"/>
+            <a:ext cx="481263" cy="1"/>
+          </a:xfrm>
+          <a:prstGeom prst="straightConnector1">
+            <a:avLst/>
+          </a:prstGeom>
+          <a:ln w="12700">
+            <a:solidFill>
+              <a:srgbClr val="FF0000"/>
+            </a:solidFill>
+            <a:tailEnd type="triangle"/>
+          </a:ln>
+        </p:spPr>
+        <p:style>
+          <a:lnRef idx="1">
+            <a:schemeClr val="accent1"/>
+          </a:lnRef>
+          <a:fillRef idx="0">
+            <a:schemeClr val="accent1"/>
+          </a:fillRef>
+          <a:effectRef idx="0">
+            <a:schemeClr val="accent1"/>
+          </a:effectRef>
+          <a:fontRef idx="minor">
+            <a:schemeClr val="tx1"/>
+          </a:fontRef>
+        </p:style>
+      </p:cxnSp>
+      <p:cxnSp>
+        <p:nvCxnSpPr>
+          <p:cNvPr id="13" name="Straight Arrow Connector 12"/>
+          <p:cNvCxnSpPr/>
+          <p:nvPr/>
+        </p:nvCxnSpPr>
+        <p:spPr>
+          <a:xfrm>
+            <a:off x="8702828" y="4160732"/>
+            <a:ext cx="481263" cy="1"/>
+          </a:xfrm>
+          <a:prstGeom prst="straightConnector1">
+            <a:avLst/>
+          </a:prstGeom>
+          <a:ln w="12700">
+            <a:solidFill>
+              <a:srgbClr val="FF0000"/>
+            </a:solidFill>
+            <a:tailEnd type="triangle"/>
+          </a:ln>
+        </p:spPr>
+        <p:style>
+          <a:lnRef idx="1">
+            <a:schemeClr val="accent1"/>
+          </a:lnRef>
+          <a:fillRef idx="0">
+            <a:schemeClr val="accent1"/>
+          </a:fillRef>
+          <a:effectRef idx="0">
+            <a:schemeClr val="accent1"/>
+          </a:effectRef>
+          <a:fontRef idx="minor">
+            <a:schemeClr val="tx1"/>
+          </a:fontRef>
+        </p:style>
+      </p:cxnSp>
     </p:spTree>
     <p:extLst>
       <p:ext uri="{BB962C8B-B14F-4D97-AF65-F5344CB8AC3E}">
         <p14:creationId xmlns:p14="http://schemas.microsoft.com/office/powerpoint/2010/main" val="1775953949"/>
+      </p:ext>
+    </p:extLst>
+  </p:cSld>
+  <p:clrMapOvr>
+    <a:masterClrMapping/>
+  </p:clrMapOvr>
+</p:sld>
+</file>
+
+<file path=ppt/slides/slide10.xml><?xml version="1.0" encoding="utf-8"?>
+<p:sld xmlns:a="http://schemas.openxmlformats.org/drawingml/2006/main" xmlns:r="http://schemas.openxmlformats.org/officeDocument/2006/relationships" xmlns:p="http://schemas.openxmlformats.org/presentationml/2006/main">
+  <p:cSld>
+    <p:spTree>
+      <p:nvGrpSpPr>
+        <p:cNvPr id="1" name=""/>
+        <p:cNvGrpSpPr/>
+        <p:nvPr/>
+      </p:nvGrpSpPr>
+      <p:grpSpPr>
+        <a:xfrm>
+          <a:off x="0" y="0"/>
+          <a:ext cx="0" cy="0"/>
+          <a:chOff x="0" y="0"/>
+          <a:chExt cx="0" cy="0"/>
+        </a:xfrm>
+      </p:grpSpPr>
+      <p:sp>
+        <p:nvSpPr>
+          <p:cNvPr id="2" name="Title 1"/>
+          <p:cNvSpPr>
+            <a:spLocks noGrp="1"/>
+          </p:cNvSpPr>
+          <p:nvPr>
+            <p:ph type="title"/>
+          </p:nvPr>
+        </p:nvSpPr>
+        <p:spPr/>
+        <p:txBody>
+          <a:bodyPr/>
+          <a:lstStyle/>
+          <a:p>
+            <a:r>
+              <a:rPr lang="en-GB" dirty="0" smtClean="0"/>
+              <a:t>Summary: All backgrounds are good enough. </a:t>
+            </a:r>
+            <a:br>
+              <a:rPr lang="en-GB" dirty="0" smtClean="0"/>
+            </a:br>
+            <a:r>
+              <a:rPr lang="en-GB" dirty="0" smtClean="0"/>
+              <a:t>What about high energy range?</a:t>
+            </a:r>
+            <a:endParaRPr lang="en-GB" dirty="0"/>
+          </a:p>
+        </p:txBody>
+      </p:sp>
+      <p:pic>
+        <p:nvPicPr>
+          <p:cNvPr id="4" name="Picture 3"/>
+          <p:cNvPicPr>
+            <a:picLocks/>
+          </p:cNvPicPr>
+          <p:nvPr/>
+        </p:nvPicPr>
+        <p:blipFill>
+          <a:blip r:embed="rId2"/>
+          <a:stretch>
+            <a:fillRect/>
+          </a:stretch>
+        </p:blipFill>
+        <p:spPr>
+          <a:xfrm>
+            <a:off x="6313800" y="2087730"/>
+            <a:ext cx="5040000" cy="3960000"/>
+          </a:xfrm>
+          <a:prstGeom prst="rect">
+            <a:avLst/>
+          </a:prstGeom>
+        </p:spPr>
+      </p:pic>
+      <p:pic>
+        <p:nvPicPr>
+          <p:cNvPr id="5" name="Picture 4"/>
+          <p:cNvPicPr>
+            <a:picLocks/>
+          </p:cNvPicPr>
+          <p:nvPr/>
+        </p:nvPicPr>
+        <p:blipFill>
+          <a:blip r:embed="rId3"/>
+          <a:stretch>
+            <a:fillRect/>
+          </a:stretch>
+        </p:blipFill>
+        <p:spPr>
+          <a:xfrm>
+            <a:off x="838200" y="2232108"/>
+            <a:ext cx="5040000" cy="3960000"/>
+          </a:xfrm>
+          <a:prstGeom prst="rect">
+            <a:avLst/>
+          </a:prstGeom>
+        </p:spPr>
+      </p:pic>
+    </p:spTree>
+    <p:extLst>
+      <p:ext uri="{BB962C8B-B14F-4D97-AF65-F5344CB8AC3E}">
+        <p14:creationId xmlns:p14="http://schemas.microsoft.com/office/powerpoint/2010/main" val="432591689"/>
+      </p:ext>
+    </p:extLst>
+  </p:cSld>
+  <p:clrMapOvr>
+    <a:masterClrMapping/>
+  </p:clrMapOvr>
+</p:sld>
+</file>
+
+<file path=ppt/slides/slide11.xml><?xml version="1.0" encoding="utf-8"?>
+<p:sld xmlns:a="http://schemas.openxmlformats.org/drawingml/2006/main" xmlns:r="http://schemas.openxmlformats.org/officeDocument/2006/relationships" xmlns:p="http://schemas.openxmlformats.org/presentationml/2006/main">
+  <p:cSld>
+    <p:spTree>
+      <p:nvGrpSpPr>
+        <p:cNvPr id="1" name=""/>
+        <p:cNvGrpSpPr/>
+        <p:nvPr/>
+      </p:nvGrpSpPr>
+      <p:grpSpPr>
+        <a:xfrm>
+          <a:off x="0" y="0"/>
+          <a:ext cx="0" cy="0"/>
+          <a:chOff x="0" y="0"/>
+          <a:chExt cx="0" cy="0"/>
+        </a:xfrm>
+      </p:grpSpPr>
+      <p:sp>
+        <p:nvSpPr>
+          <p:cNvPr id="2" name="Title 1"/>
+          <p:cNvSpPr>
+            <a:spLocks noGrp="1"/>
+          </p:cNvSpPr>
+          <p:nvPr>
+            <p:ph type="title"/>
+          </p:nvPr>
+        </p:nvSpPr>
+        <p:spPr/>
+        <p:txBody>
+          <a:bodyPr/>
+          <a:lstStyle/>
+          <a:p>
+            <a:r>
+              <a:rPr lang="en-GB" dirty="0" smtClean="0"/>
+              <a:t>Fitting with DFT model (</a:t>
+            </a:r>
+            <a:r>
+              <a:rPr lang="en-GB" sz="2800" dirty="0" smtClean="0"/>
+              <a:t>Quantum expresso calculations</a:t>
+            </a:r>
+            <a:r>
+              <a:rPr lang="en-GB" dirty="0" smtClean="0"/>
+              <a:t>)</a:t>
+            </a:r>
+            <a:endParaRPr lang="en-GB" dirty="0"/>
+          </a:p>
+        </p:txBody>
+      </p:sp>
+      <p:pic>
+        <p:nvPicPr>
+          <p:cNvPr id="4" name="Picture 3"/>
+          <p:cNvPicPr>
+            <a:picLocks noChangeAspect="1"/>
+          </p:cNvPicPr>
+          <p:nvPr/>
+        </p:nvPicPr>
+        <p:blipFill>
+          <a:blip r:embed="rId2"/>
+          <a:stretch>
+            <a:fillRect/>
+          </a:stretch>
+        </p:blipFill>
+        <p:spPr>
+          <a:xfrm>
+            <a:off x="675750" y="2192424"/>
+            <a:ext cx="5334000" cy="4000500"/>
+          </a:xfrm>
+          <a:prstGeom prst="rect">
+            <a:avLst/>
+          </a:prstGeom>
+        </p:spPr>
+      </p:pic>
+      <p:pic>
+        <p:nvPicPr>
+          <p:cNvPr id="5" name="Picture 4"/>
+          <p:cNvPicPr>
+            <a:picLocks noChangeAspect="1"/>
+          </p:cNvPicPr>
+          <p:nvPr/>
+        </p:nvPicPr>
+        <p:blipFill>
+          <a:blip r:embed="rId3"/>
+          <a:stretch>
+            <a:fillRect/>
+          </a:stretch>
+        </p:blipFill>
+        <p:spPr>
+          <a:xfrm>
+            <a:off x="6292779" y="2192424"/>
+            <a:ext cx="5334000" cy="4000500"/>
+          </a:xfrm>
+          <a:prstGeom prst="rect">
+            <a:avLst/>
+          </a:prstGeom>
+        </p:spPr>
+      </p:pic>
+      <p:sp>
+        <p:nvSpPr>
+          <p:cNvPr id="6" name="TextBox 5"/>
+          <p:cNvSpPr txBox="1"/>
+          <p:nvPr/>
+        </p:nvSpPr>
+        <p:spPr>
+          <a:xfrm>
+            <a:off x="330535" y="6192924"/>
+            <a:ext cx="11003269" cy="646331"/>
+          </a:xfrm>
+          <a:prstGeom prst="rect">
+            <a:avLst/>
+          </a:prstGeom>
+          <a:noFill/>
+        </p:spPr>
+        <p:txBody>
+          <a:bodyPr wrap="none" rtlCol="0">
+            <a:spAutoFit/>
+          </a:bodyPr>
+          <a:lstStyle/>
+          <a:p>
+            <a:r>
+              <a:rPr lang="en-GB" dirty="0" smtClean="0"/>
+              <a:t>Amplitude of the model goes to 0 (10</a:t>
+            </a:r>
+            <a:r>
+              <a:rPr lang="en-GB" baseline="30000" dirty="0" smtClean="0"/>
+              <a:t>-5</a:t>
+            </a:r>
+            <a:r>
+              <a:rPr lang="en-GB" dirty="0" smtClean="0"/>
+              <a:t> as, it seems, the intensity at the edges in experiment falls much faster then </a:t>
+            </a:r>
+          </a:p>
+          <a:p>
+            <a:r>
+              <a:rPr lang="en-GB" dirty="0" smtClean="0"/>
+              <a:t>predicted according to magnetic form factor.</a:t>
+            </a:r>
+            <a:endParaRPr lang="en-GB" dirty="0"/>
+          </a:p>
+        </p:txBody>
+      </p:sp>
+    </p:spTree>
+    <p:extLst>
+      <p:ext uri="{BB962C8B-B14F-4D97-AF65-F5344CB8AC3E}">
+        <p14:creationId xmlns:p14="http://schemas.microsoft.com/office/powerpoint/2010/main" val="2494090850"/>
       </p:ext>
     </p:extLst>
   </p:cSld>
@@ -3109,6 +3557,243 @@
         </p:nvSpPr>
         <p:spPr/>
         <p:txBody>
+          <a:bodyPr/>
+          <a:lstStyle/>
+          <a:p>
+            <a:r>
+              <a:rPr lang="en-GB" dirty="0" smtClean="0"/>
+              <a:t>Conclusion:</a:t>
+            </a:r>
+            <a:endParaRPr lang="en-GB" dirty="0"/>
+          </a:p>
+        </p:txBody>
+      </p:sp>
+      <p:sp>
+        <p:nvSpPr>
+          <p:cNvPr id="4" name="TextBox 3"/>
+          <p:cNvSpPr txBox="1"/>
+          <p:nvPr/>
+        </p:nvSpPr>
+        <p:spPr>
+          <a:xfrm>
+            <a:off x="838200" y="1690688"/>
+            <a:ext cx="4441472" cy="369332"/>
+          </a:xfrm>
+          <a:prstGeom prst="rect">
+            <a:avLst/>
+          </a:prstGeom>
+          <a:noFill/>
+        </p:spPr>
+        <p:txBody>
+          <a:bodyPr wrap="none" rtlCol="0">
+            <a:spAutoFit/>
+          </a:bodyPr>
+          <a:lstStyle/>
+          <a:p>
+            <a:r>
+              <a:rPr lang="en-GB" dirty="0" smtClean="0"/>
+              <a:t>The cuts have exponential background region</a:t>
+            </a:r>
+          </a:p>
+        </p:txBody>
+      </p:sp>
+      <p:sp>
+        <p:nvSpPr>
+          <p:cNvPr id="5" name="TextBox 4"/>
+          <p:cNvSpPr txBox="1"/>
+          <p:nvPr/>
+        </p:nvSpPr>
+        <p:spPr>
+          <a:xfrm>
+            <a:off x="838200" y="2240423"/>
+            <a:ext cx="9734653" cy="646331"/>
+          </a:xfrm>
+          <a:prstGeom prst="rect">
+            <a:avLst/>
+          </a:prstGeom>
+          <a:noFill/>
+        </p:spPr>
+        <p:txBody>
+          <a:bodyPr wrap="none" rtlCol="0">
+            <a:spAutoFit/>
+          </a:bodyPr>
+          <a:lstStyle/>
+          <a:p>
+            <a:r>
+              <a:rPr lang="en-GB" dirty="0" smtClean="0"/>
+              <a:t>Similar  type of cuts (symmetrical </a:t>
+            </a:r>
+            <a:r>
+              <a:rPr lang="en-GB" dirty="0" err="1" smtClean="0"/>
+              <a:t>wrt</a:t>
+            </a:r>
+            <a:r>
+              <a:rPr lang="en-GB" dirty="0" smtClean="0"/>
+              <a:t>. the beam direction and at the same Q distance from the [0,0,0])</a:t>
+            </a:r>
+          </a:p>
+          <a:p>
+            <a:r>
+              <a:rPr lang="en-GB" dirty="0" smtClean="0"/>
+              <a:t>have similar exponential background parameters</a:t>
+            </a:r>
+          </a:p>
+        </p:txBody>
+      </p:sp>
+      <p:sp>
+        <p:nvSpPr>
+          <p:cNvPr id="6" name="TextBox 5"/>
+          <p:cNvSpPr txBox="1"/>
+          <p:nvPr/>
+        </p:nvSpPr>
+        <p:spPr>
+          <a:xfrm>
+            <a:off x="838200" y="3081640"/>
+            <a:ext cx="10434844" cy="369332"/>
+          </a:xfrm>
+          <a:prstGeom prst="rect">
+            <a:avLst/>
+          </a:prstGeom>
+          <a:noFill/>
+        </p:spPr>
+        <p:txBody>
+          <a:bodyPr wrap="none" rtlCol="0">
+            <a:spAutoFit/>
+          </a:bodyPr>
+          <a:lstStyle/>
+          <a:p>
+            <a:r>
+              <a:rPr lang="en-GB" dirty="0" smtClean="0"/>
+              <a:t>The background parameters identified for group of similar cuts are independent on the way of obtaining them</a:t>
+            </a:r>
+          </a:p>
+        </p:txBody>
+      </p:sp>
+      <p:sp>
+        <p:nvSpPr>
+          <p:cNvPr id="7" name="TextBox 6"/>
+          <p:cNvSpPr txBox="1"/>
+          <p:nvPr/>
+        </p:nvSpPr>
+        <p:spPr>
+          <a:xfrm>
+            <a:off x="838200" y="3645858"/>
+            <a:ext cx="10167912" cy="646331"/>
+          </a:xfrm>
+          <a:prstGeom prst="rect">
+            <a:avLst/>
+          </a:prstGeom>
+          <a:noFill/>
+        </p:spPr>
+        <p:txBody>
+          <a:bodyPr wrap="none" rtlCol="0">
+            <a:spAutoFit/>
+          </a:bodyPr>
+          <a:lstStyle/>
+          <a:p>
+            <a:r>
+              <a:rPr lang="en-GB" dirty="0" smtClean="0"/>
+              <a:t>The background parameters obtained for one group of similar cuts are not consistent with the parameters,</a:t>
+            </a:r>
+          </a:p>
+          <a:p>
+            <a:r>
+              <a:rPr lang="en-GB" dirty="0"/>
+              <a:t>o</a:t>
+            </a:r>
+            <a:r>
+              <a:rPr lang="en-GB" dirty="0" smtClean="0"/>
+              <a:t>btained for another group</a:t>
+            </a:r>
+          </a:p>
+        </p:txBody>
+      </p:sp>
+      <p:sp>
+        <p:nvSpPr>
+          <p:cNvPr id="8" name="TextBox 7"/>
+          <p:cNvSpPr txBox="1"/>
+          <p:nvPr/>
+        </p:nvSpPr>
+        <p:spPr>
+          <a:xfrm>
+            <a:off x="859972" y="4541835"/>
+            <a:ext cx="10509415" cy="646331"/>
+          </a:xfrm>
+          <a:prstGeom prst="rect">
+            <a:avLst/>
+          </a:prstGeom>
+          <a:noFill/>
+        </p:spPr>
+        <p:txBody>
+          <a:bodyPr wrap="none" rtlCol="0">
+            <a:spAutoFit/>
+          </a:bodyPr>
+          <a:lstStyle/>
+          <a:p>
+            <a:r>
+              <a:rPr lang="en-GB" dirty="0" smtClean="0"/>
+              <a:t>Fitting &amp;  numerical comparison with </a:t>
+            </a:r>
+            <a:r>
+              <a:rPr lang="en-GB" dirty="0" err="1" smtClean="0"/>
+              <a:t>Kun’s</a:t>
+            </a:r>
+            <a:r>
+              <a:rPr lang="en-GB" dirty="0" smtClean="0"/>
+              <a:t> calculations does not work. The apparent reason for this is that </a:t>
+            </a:r>
+          </a:p>
+          <a:p>
+            <a:r>
+              <a:rPr lang="en-GB" dirty="0" smtClean="0"/>
+              <a:t>the theoretical decay, predicted by magnetic form factor is much smaller then the one, observed in experiment</a:t>
+            </a:r>
+            <a:endParaRPr lang="en-GB" dirty="0" smtClean="0"/>
+          </a:p>
+        </p:txBody>
+      </p:sp>
+    </p:spTree>
+    <p:extLst>
+      <p:ext uri="{BB962C8B-B14F-4D97-AF65-F5344CB8AC3E}">
+        <p14:creationId xmlns:p14="http://schemas.microsoft.com/office/powerpoint/2010/main" val="3875574638"/>
+      </p:ext>
+    </p:extLst>
+  </p:cSld>
+  <p:clrMapOvr>
+    <a:masterClrMapping/>
+  </p:clrMapOvr>
+</p:sld>
+</file>
+
+<file path=ppt/slides/slide3.xml><?xml version="1.0" encoding="utf-8"?>
+<p:sld xmlns:a="http://schemas.openxmlformats.org/drawingml/2006/main" xmlns:r="http://schemas.openxmlformats.org/officeDocument/2006/relationships" xmlns:p="http://schemas.openxmlformats.org/presentationml/2006/main">
+  <p:cSld>
+    <p:spTree>
+      <p:nvGrpSpPr>
+        <p:cNvPr id="1" name=""/>
+        <p:cNvGrpSpPr/>
+        <p:nvPr/>
+      </p:nvGrpSpPr>
+      <p:grpSpPr>
+        <a:xfrm>
+          <a:off x="0" y="0"/>
+          <a:ext cx="0" cy="0"/>
+          <a:chOff x="0" y="0"/>
+          <a:chExt cx="0" cy="0"/>
+        </a:xfrm>
+      </p:grpSpPr>
+      <p:sp>
+        <p:nvSpPr>
+          <p:cNvPr id="2" name="Title 1"/>
+          <p:cNvSpPr>
+            <a:spLocks noGrp="1"/>
+          </p:cNvSpPr>
+          <p:nvPr>
+            <p:ph type="title"/>
+          </p:nvPr>
+        </p:nvSpPr>
+        <p:spPr/>
+        <p:txBody>
           <a:bodyPr>
             <a:normAutofit/>
           </a:bodyPr>
@@ -3130,20 +3815,12 @@
               <a:rPr lang="en-GB" dirty="0" smtClean="0"/>
               <a:t>:</a:t>
             </a:r>
-            <a:r>
-              <a:rPr lang="en-GB" dirty="0" smtClean="0"/>
-              <a:t/>
-            </a:r>
             <a:br>
               <a:rPr lang="en-GB" dirty="0" smtClean="0"/>
             </a:br>
             <a:r>
               <a:rPr lang="en-GB" sz="2400" dirty="0" smtClean="0"/>
-              <a:t>edges of np cut at [-0.5,2.5,-0.5]; </a:t>
-            </a:r>
-            <a:r>
-              <a:rPr lang="en-GB" sz="2400" dirty="0" smtClean="0"/>
-              <a:t>[0.5,2.5,-0.5]</a:t>
+              <a:t>edges of np cut at [-0.5,2.5,-0.5]; [0.5,2.5,-0.5]</a:t>
             </a:r>
             <a:endParaRPr lang="en-GB" sz="2400" dirty="0"/>
           </a:p>
@@ -3302,7 +3979,7 @@
 </p:sld>
 </file>
 
-<file path=ppt/slides/slide3.xml><?xml version="1.0" encoding="utf-8"?>
+<file path=ppt/slides/slide4.xml><?xml version="1.0" encoding="utf-8"?>
 <p:sld xmlns:a="http://schemas.openxmlformats.org/drawingml/2006/main" xmlns:r="http://schemas.openxmlformats.org/officeDocument/2006/relationships" xmlns:p="http://schemas.openxmlformats.org/presentationml/2006/main">
   <p:cSld>
     <p:spTree>
@@ -3554,228 +4231,6 @@
 </p:sld>
 </file>
 
-<file path=ppt/slides/slide4.xml><?xml version="1.0" encoding="utf-8"?>
-<p:sld xmlns:a="http://schemas.openxmlformats.org/drawingml/2006/main" xmlns:r="http://schemas.openxmlformats.org/officeDocument/2006/relationships" xmlns:p="http://schemas.openxmlformats.org/presentationml/2006/main">
-  <p:cSld>
-    <p:spTree>
-      <p:nvGrpSpPr>
-        <p:cNvPr id="1" name=""/>
-        <p:cNvGrpSpPr/>
-        <p:nvPr/>
-      </p:nvGrpSpPr>
-      <p:grpSpPr>
-        <a:xfrm>
-          <a:off x="0" y="0"/>
-          <a:ext cx="0" cy="0"/>
-          <a:chOff x="0" y="0"/>
-          <a:chExt cx="0" cy="0"/>
-        </a:xfrm>
-      </p:grpSpPr>
-      <p:sp>
-        <p:nvSpPr>
-          <p:cNvPr id="2" name="Title 1"/>
-          <p:cNvSpPr>
-            <a:spLocks noGrp="1"/>
-          </p:cNvSpPr>
-          <p:nvPr>
-            <p:ph type="title"/>
-          </p:nvPr>
-        </p:nvSpPr>
-        <p:spPr>
-          <a:xfrm>
-            <a:off x="5221705" y="0"/>
-            <a:ext cx="5987716" cy="1325563"/>
-          </a:xfrm>
-        </p:spPr>
-        <p:txBody>
-          <a:bodyPr>
-            <a:normAutofit/>
-          </a:bodyPr>
-          <a:lstStyle/>
-          <a:p>
-            <a:r>
-              <a:rPr lang="en-GB" sz="3100" dirty="0" err="1" smtClean="0"/>
-              <a:t>sym_cut</a:t>
-            </a:r>
-            <a:r>
-              <a:rPr lang="en-GB" sz="3100" dirty="0" smtClean="0"/>
-              <a:t> with Background1 (</a:t>
-            </a:r>
-            <a:r>
-              <a:rPr lang="en-GB" sz="3100" b="1" dirty="0" err="1" smtClean="0"/>
-              <a:t>cut_at_edges</a:t>
-            </a:r>
-            <a:r>
-              <a:rPr lang="en-GB" sz="3100" b="1" dirty="0" smtClean="0"/>
-              <a:t>)</a:t>
-            </a:r>
-            <a:r>
-              <a:rPr lang="en-GB" dirty="0" smtClean="0"/>
-              <a:t>: </a:t>
-            </a:r>
-            <a:endParaRPr lang="en-GB" dirty="0"/>
-          </a:p>
-        </p:txBody>
-      </p:sp>
-      <p:pic>
-        <p:nvPicPr>
-          <p:cNvPr id="4" name="Picture 3"/>
-          <p:cNvPicPr>
-            <a:picLocks noChangeAspect="1"/>
-          </p:cNvPicPr>
-          <p:nvPr/>
-        </p:nvPicPr>
-        <p:blipFill>
-          <a:blip r:embed="rId2"/>
-          <a:stretch>
-            <a:fillRect/>
-          </a:stretch>
-        </p:blipFill>
-        <p:spPr>
-          <a:xfrm>
-            <a:off x="499309" y="201531"/>
-            <a:ext cx="4320000" cy="3240000"/>
-          </a:xfrm>
-          <a:prstGeom prst="rect">
-            <a:avLst/>
-          </a:prstGeom>
-        </p:spPr>
-      </p:pic>
-      <p:pic>
-        <p:nvPicPr>
-          <p:cNvPr id="5" name="Picture 4"/>
-          <p:cNvPicPr>
-            <a:picLocks noChangeAspect="1"/>
-          </p:cNvPicPr>
-          <p:nvPr/>
-        </p:nvPicPr>
-        <p:blipFill>
-          <a:blip r:embed="rId3"/>
-          <a:stretch>
-            <a:fillRect/>
-          </a:stretch>
-        </p:blipFill>
-        <p:spPr>
-          <a:xfrm>
-            <a:off x="6392117" y="1217279"/>
-            <a:ext cx="5219700" cy="4000500"/>
-          </a:xfrm>
-          <a:prstGeom prst="rect">
-            <a:avLst/>
-          </a:prstGeom>
-        </p:spPr>
-      </p:pic>
-      <p:pic>
-        <p:nvPicPr>
-          <p:cNvPr id="6" name="Picture 5"/>
-          <p:cNvPicPr>
-            <a:picLocks noChangeAspect="1"/>
-          </p:cNvPicPr>
-          <p:nvPr/>
-        </p:nvPicPr>
-        <p:blipFill>
-          <a:blip r:embed="rId4"/>
-          <a:stretch>
-            <a:fillRect/>
-          </a:stretch>
-        </p:blipFill>
-        <p:spPr>
-          <a:xfrm>
-            <a:off x="499309" y="3441531"/>
-            <a:ext cx="4320000" cy="3240000"/>
-          </a:xfrm>
-          <a:prstGeom prst="rect">
-            <a:avLst/>
-          </a:prstGeom>
-        </p:spPr>
-      </p:pic>
-      <p:sp>
-        <p:nvSpPr>
-          <p:cNvPr id="7" name="TextBox 6"/>
-          <p:cNvSpPr txBox="1"/>
-          <p:nvPr/>
-        </p:nvSpPr>
-        <p:spPr>
-          <a:xfrm>
-            <a:off x="893462" y="3537784"/>
-            <a:ext cx="3141501" cy="369332"/>
-          </a:xfrm>
-          <a:prstGeom prst="rect">
-            <a:avLst/>
-          </a:prstGeom>
-          <a:solidFill>
-            <a:schemeClr val="bg1"/>
-          </a:solidFill>
-        </p:spPr>
-        <p:txBody>
-          <a:bodyPr wrap="none" rtlCol="0">
-            <a:spAutoFit/>
-          </a:bodyPr>
-          <a:lstStyle/>
-          <a:p>
-            <a:r>
-              <a:rPr lang="en-GB" dirty="0" smtClean="0"/>
-              <a:t>Corrected magnetic form factor</a:t>
-            </a:r>
-            <a:endParaRPr lang="en-GB" dirty="0"/>
-          </a:p>
-        </p:txBody>
-      </p:sp>
-      <p:sp>
-        <p:nvSpPr>
-          <p:cNvPr id="8" name="TextBox 7"/>
-          <p:cNvSpPr txBox="1"/>
-          <p:nvPr/>
-        </p:nvSpPr>
-        <p:spPr>
-          <a:xfrm>
-            <a:off x="5702968" y="5799221"/>
-            <a:ext cx="3876574" cy="369332"/>
-          </a:xfrm>
-          <a:prstGeom prst="rect">
-            <a:avLst/>
-          </a:prstGeom>
-          <a:noFill/>
-        </p:spPr>
-        <p:txBody>
-          <a:bodyPr wrap="none" rtlCol="0">
-            <a:spAutoFit/>
-          </a:bodyPr>
-          <a:lstStyle/>
-          <a:p>
-            <a:r>
-              <a:rPr lang="en-GB" dirty="0" smtClean="0"/>
-              <a:t>Fitting parameters: </a:t>
-            </a:r>
-            <a:r>
-              <a:rPr lang="en-GB" b="1" dirty="0"/>
-              <a:t>0.468004 </a:t>
-            </a:r>
-            <a:r>
-              <a:rPr lang="en-GB" b="1" dirty="0" smtClean="0"/>
-              <a:t>0.015127</a:t>
-            </a:r>
-            <a:r>
-              <a:rPr lang="en-GB" dirty="0" smtClean="0"/>
-              <a:t> </a:t>
-            </a:r>
-            <a:endParaRPr lang="en-GB" dirty="0"/>
-          </a:p>
-        </p:txBody>
-      </p:sp>
-    </p:spTree>
-    <p:extLst>
-      <p:ext uri="{BB962C8B-B14F-4D97-AF65-F5344CB8AC3E}">
-        <p14:creationId xmlns:p14="http://schemas.microsoft.com/office/powerpoint/2010/main" val="24320326"/>
-      </p:ext>
-    </p:extLst>
-  </p:cSld>
-  <p:clrMapOvr>
-    <a:masterClrMapping/>
-  </p:clrMapOvr>
-</p:sld>
-</file>
-
 <file path=ppt/slides/slide5.xml><?xml version="1.0" encoding="utf-8"?>
 <p:sld xmlns:a="http://schemas.openxmlformats.org/drawingml/2006/main" xmlns:r="http://schemas.openxmlformats.org/officeDocument/2006/relationships" xmlns:p="http://schemas.openxmlformats.org/presentationml/2006/main">
   <p:cSld>
@@ -3795,51 +4250,53 @@
       </p:grpSpPr>
       <p:sp>
         <p:nvSpPr>
-          <p:cNvPr id="4" name="Rectangle 3"/>
-          <p:cNvSpPr/>
-          <p:nvPr/>
-        </p:nvSpPr>
-        <p:spPr>
-          <a:xfrm>
-            <a:off x="689811" y="302477"/>
-            <a:ext cx="6096000" cy="646331"/>
-          </a:xfrm>
-          <a:prstGeom prst="rect">
-            <a:avLst/>
-          </a:prstGeom>
+          <p:cNvPr id="2" name="Title 1"/>
+          <p:cNvSpPr>
+            <a:spLocks noGrp="1"/>
+          </p:cNvSpPr>
+          <p:nvPr>
+            <p:ph type="title"/>
+          </p:nvPr>
+        </p:nvSpPr>
+        <p:spPr>
+          <a:xfrm>
+            <a:off x="5221705" y="0"/>
+            <a:ext cx="5987716" cy="1325563"/>
+          </a:xfrm>
         </p:spPr>
         <p:txBody>
           <a:bodyPr>
-            <a:spAutoFit/>
+            <a:normAutofit/>
           </a:bodyPr>
           <a:lstStyle/>
           <a:p>
             <a:r>
+              <a:rPr lang="en-GB" sz="3100" dirty="0" err="1" smtClean="0"/>
+              <a:t>sym_cut</a:t>
+            </a:r>
+            <a:r>
+              <a:rPr lang="en-GB" sz="3100" dirty="0" smtClean="0"/>
+              <a:t> with Background1 (</a:t>
+            </a:r>
+            <a:r>
+              <a:rPr lang="en-GB" sz="3100" b="1" dirty="0" err="1" smtClean="0"/>
+              <a:t>cut_at_edges</a:t>
+            </a:r>
+            <a:r>
+              <a:rPr lang="en-GB" sz="3100" b="1" dirty="0" smtClean="0"/>
+              <a:t>)</a:t>
+            </a:r>
+            <a:r>
               <a:rPr lang="en-GB" dirty="0" smtClean="0"/>
-              <a:t>Background2 (</a:t>
-            </a:r>
-            <a:r>
-              <a:rPr lang="en-GB" b="1" dirty="0" err="1" smtClean="0"/>
-              <a:t>average_cut</a:t>
-            </a:r>
-            <a:r>
-              <a:rPr lang="en-GB" b="1" dirty="0" smtClean="0"/>
-              <a:t>)</a:t>
-            </a:r>
-            <a:r>
-              <a:rPr lang="en-GB" dirty="0" smtClean="0"/>
-              <a:t>:</a:t>
-            </a:r>
-            <a:br>
-              <a:rPr lang="en-GB" dirty="0" smtClean="0"/>
-            </a:br>
+              <a:t>: </a:t>
+            </a:r>
             <a:endParaRPr lang="en-GB" dirty="0"/>
           </a:p>
         </p:txBody>
       </p:sp>
       <p:pic>
         <p:nvPicPr>
-          <p:cNvPr id="5" name="Picture 4"/>
+          <p:cNvPr id="4" name="Picture 3"/>
           <p:cNvPicPr>
             <a:picLocks noChangeAspect="1"/>
           </p:cNvPicPr>
@@ -3853,8 +4310,8 @@
         </p:blipFill>
         <p:spPr>
           <a:xfrm>
-            <a:off x="553453" y="1452813"/>
-            <a:ext cx="5334000" cy="4000500"/>
+            <a:off x="499309" y="201531"/>
+            <a:ext cx="4320000" cy="3240000"/>
           </a:xfrm>
           <a:prstGeom prst="rect">
             <a:avLst/>
@@ -3863,7 +4320,7 @@
       </p:pic>
       <p:pic>
         <p:nvPicPr>
-          <p:cNvPr id="6" name="Picture 5"/>
+          <p:cNvPr id="5" name="Picture 4"/>
           <p:cNvPicPr>
             <a:picLocks noChangeAspect="1"/>
           </p:cNvPicPr>
@@ -3877,18 +4334,116 @@
         </p:blipFill>
         <p:spPr>
           <a:xfrm>
-            <a:off x="5887453" y="1452813"/>
-            <a:ext cx="5334000" cy="4000500"/>
+            <a:off x="6392117" y="1217279"/>
+            <a:ext cx="5219700" cy="4000500"/>
           </a:xfrm>
           <a:prstGeom prst="rect">
             <a:avLst/>
           </a:prstGeom>
         </p:spPr>
       </p:pic>
+      <p:pic>
+        <p:nvPicPr>
+          <p:cNvPr id="6" name="Picture 5"/>
+          <p:cNvPicPr>
+            <a:picLocks noChangeAspect="1"/>
+          </p:cNvPicPr>
+          <p:nvPr/>
+        </p:nvPicPr>
+        <p:blipFill>
+          <a:blip r:embed="rId4"/>
+          <a:stretch>
+            <a:fillRect/>
+          </a:stretch>
+        </p:blipFill>
+        <p:spPr>
+          <a:xfrm>
+            <a:off x="499309" y="3441531"/>
+            <a:ext cx="4320000" cy="3240000"/>
+          </a:xfrm>
+          <a:prstGeom prst="rect">
+            <a:avLst/>
+          </a:prstGeom>
+        </p:spPr>
+      </p:pic>
+      <p:sp>
+        <p:nvSpPr>
+          <p:cNvPr id="7" name="TextBox 6"/>
+          <p:cNvSpPr txBox="1"/>
+          <p:nvPr/>
+        </p:nvSpPr>
+        <p:spPr>
+          <a:xfrm>
+            <a:off x="893462" y="3537784"/>
+            <a:ext cx="3141501" cy="369332"/>
+          </a:xfrm>
+          <a:prstGeom prst="rect">
+            <a:avLst/>
+          </a:prstGeom>
+          <a:solidFill>
+            <a:schemeClr val="bg1"/>
+          </a:solidFill>
+        </p:spPr>
+        <p:txBody>
+          <a:bodyPr wrap="none" rtlCol="0">
+            <a:spAutoFit/>
+          </a:bodyPr>
+          <a:lstStyle/>
+          <a:p>
+            <a:r>
+              <a:rPr lang="en-GB" dirty="0" smtClean="0"/>
+              <a:t>Corrected magnetic form factor</a:t>
+            </a:r>
+            <a:endParaRPr lang="en-GB" dirty="0"/>
+          </a:p>
+        </p:txBody>
+      </p:sp>
+      <p:sp>
+        <p:nvSpPr>
+          <p:cNvPr id="8" name="TextBox 7"/>
+          <p:cNvSpPr txBox="1"/>
+          <p:nvPr/>
+        </p:nvSpPr>
+        <p:spPr>
+          <a:xfrm>
+            <a:off x="5702968" y="5799221"/>
+            <a:ext cx="3876574" cy="369332"/>
+          </a:xfrm>
+          <a:prstGeom prst="rect">
+            <a:avLst/>
+          </a:prstGeom>
+          <a:noFill/>
+        </p:spPr>
+        <p:txBody>
+          <a:bodyPr wrap="none" rtlCol="0">
+            <a:spAutoFit/>
+          </a:bodyPr>
+          <a:lstStyle/>
+          <a:p>
+            <a:r>
+              <a:rPr lang="en-GB" dirty="0" smtClean="0"/>
+              <a:t>Fitting parameters: </a:t>
+            </a:r>
+            <a:r>
+              <a:rPr lang="en-GB" b="1" dirty="0"/>
+              <a:t>0.468004 </a:t>
+            </a:r>
+            <a:r>
+              <a:rPr lang="en-GB" b="1" dirty="0" smtClean="0"/>
+              <a:t>0.015127</a:t>
+            </a:r>
+            <a:r>
+              <a:rPr lang="en-GB" dirty="0" smtClean="0"/>
+              <a:t> </a:t>
+            </a:r>
+            <a:endParaRPr lang="en-GB" dirty="0"/>
+          </a:p>
+        </p:txBody>
+      </p:sp>
     </p:spTree>
     <p:extLst>
       <p:ext uri="{BB962C8B-B14F-4D97-AF65-F5344CB8AC3E}">
-        <p14:creationId xmlns:p14="http://schemas.microsoft.com/office/powerpoint/2010/main" val="4264760487"/>
+        <p14:creationId xmlns:p14="http://schemas.microsoft.com/office/powerpoint/2010/main" val="24320326"/>
       </p:ext>
     </p:extLst>
   </p:cSld>
@@ -3917,39 +4472,53 @@
       </p:grpSpPr>
       <p:sp>
         <p:nvSpPr>
-          <p:cNvPr id="2" name="Title 1"/>
-          <p:cNvSpPr>
-            <a:spLocks noGrp="1"/>
-          </p:cNvSpPr>
-          <p:nvPr>
-            <p:ph type="title"/>
-          </p:nvPr>
-        </p:nvSpPr>
-        <p:spPr>
-          <a:xfrm>
-            <a:off x="802105" y="1"/>
-            <a:ext cx="10515600" cy="866274"/>
-          </a:xfrm>
+          <p:cNvPr id="4" name="Rectangle 3"/>
+          <p:cNvSpPr/>
+          <p:nvPr/>
+        </p:nvSpPr>
+        <p:spPr>
+          <a:xfrm>
+            <a:off x="689811" y="302477"/>
+            <a:ext cx="6096000" cy="646331"/>
+          </a:xfrm>
+          <a:prstGeom prst="rect">
+            <a:avLst/>
+          </a:prstGeom>
         </p:spPr>
         <p:txBody>
           <a:bodyPr>
-            <a:normAutofit/>
+            <a:spAutoFit/>
           </a:bodyPr>
           <a:lstStyle/>
           <a:p>
             <a:r>
-              <a:rPr lang="en-GB" sz="2400" dirty="0" smtClean="0"/>
-              <a:t>Partial cuts:</a:t>
-            </a:r>
-            <a:endParaRPr lang="en-GB" sz="2400" dirty="0"/>
+              <a:rPr lang="en-GB" dirty="0" smtClean="0"/>
+              <a:t>Background2 (</a:t>
+            </a:r>
+            <a:r>
+              <a:rPr lang="en-GB" b="1" dirty="0" err="1" smtClean="0"/>
+              <a:t>average_cut</a:t>
+            </a:r>
+            <a:r>
+              <a:rPr lang="en-GB" b="1" dirty="0" smtClean="0"/>
+              <a:t>)</a:t>
+            </a:r>
+            <a:r>
+              <a:rPr lang="en-GB" dirty="0" smtClean="0"/>
+              <a:t>:</a:t>
+            </a:r>
+            <a:br>
+              <a:rPr lang="en-GB" dirty="0" smtClean="0"/>
+            </a:br>
+            <a:endParaRPr lang="en-GB" dirty="0"/>
           </a:p>
         </p:txBody>
       </p:sp>
       <p:pic>
         <p:nvPicPr>
-          <p:cNvPr id="3" name="Picture 2"/>
+          <p:cNvPr id="5" name="Picture 4"/>
           <p:cNvPicPr>
-            <a:picLocks/>
+            <a:picLocks noChangeAspect="1"/>
           </p:cNvPicPr>
           <p:nvPr/>
         </p:nvPicPr>
@@ -3961,8 +4530,8 @@
         </p:blipFill>
         <p:spPr>
           <a:xfrm>
-            <a:off x="433908" y="718887"/>
-            <a:ext cx="2880000" cy="2520000"/>
+            <a:off x="553453" y="1452813"/>
+            <a:ext cx="5334000" cy="4000500"/>
           </a:xfrm>
           <a:prstGeom prst="rect">
             <a:avLst/>
@@ -3971,9 +4540,9 @@
       </p:pic>
       <p:pic>
         <p:nvPicPr>
-          <p:cNvPr id="5" name="Picture 4"/>
+          <p:cNvPr id="6" name="Picture 5"/>
           <p:cNvPicPr>
-            <a:picLocks/>
+            <a:picLocks noChangeAspect="1"/>
           </p:cNvPicPr>
           <p:nvPr/>
         </p:nvPicPr>
@@ -3985,152 +4554,8 @@
         </p:blipFill>
         <p:spPr>
           <a:xfrm>
-            <a:off x="3179905" y="718887"/>
-            <a:ext cx="2880000" cy="2520000"/>
-          </a:xfrm>
-          <a:prstGeom prst="rect">
-            <a:avLst/>
-          </a:prstGeom>
-        </p:spPr>
-      </p:pic>
-      <p:pic>
-        <p:nvPicPr>
-          <p:cNvPr id="7" name="Picture 6"/>
-          <p:cNvPicPr>
-            <a:picLocks/>
-          </p:cNvPicPr>
-          <p:nvPr/>
-        </p:nvPicPr>
-        <p:blipFill>
-          <a:blip r:embed="rId4"/>
-          <a:stretch>
-            <a:fillRect/>
-          </a:stretch>
-        </p:blipFill>
-        <p:spPr>
-          <a:xfrm>
-            <a:off x="332760" y="3597773"/>
-            <a:ext cx="2880000" cy="2520000"/>
-          </a:xfrm>
-          <a:prstGeom prst="rect">
-            <a:avLst/>
-          </a:prstGeom>
-        </p:spPr>
-      </p:pic>
-      <p:pic>
-        <p:nvPicPr>
-          <p:cNvPr id="8" name="Picture 7"/>
-          <p:cNvPicPr>
-            <a:picLocks/>
-          </p:cNvPicPr>
-          <p:nvPr/>
-        </p:nvPicPr>
-        <p:blipFill>
-          <a:blip r:embed="rId5"/>
-          <a:stretch>
-            <a:fillRect/>
-          </a:stretch>
-        </p:blipFill>
-        <p:spPr>
-          <a:xfrm>
-            <a:off x="3313908" y="3597773"/>
-            <a:ext cx="2880000" cy="2520000"/>
-          </a:xfrm>
-          <a:prstGeom prst="rect">
-            <a:avLst/>
-          </a:prstGeom>
-        </p:spPr>
-      </p:pic>
-      <p:pic>
-        <p:nvPicPr>
-          <p:cNvPr id="9" name="Picture 8"/>
-          <p:cNvPicPr>
-            <a:picLocks/>
-          </p:cNvPicPr>
-          <p:nvPr/>
-        </p:nvPicPr>
-        <p:blipFill>
-          <a:blip r:embed="rId6"/>
-          <a:stretch>
-            <a:fillRect/>
-          </a:stretch>
-        </p:blipFill>
-        <p:spPr>
-          <a:xfrm>
-            <a:off x="6295056" y="716324"/>
-            <a:ext cx="2880000" cy="2520000"/>
-          </a:xfrm>
-          <a:prstGeom prst="rect">
-            <a:avLst/>
-          </a:prstGeom>
-        </p:spPr>
-      </p:pic>
-      <p:pic>
-        <p:nvPicPr>
-          <p:cNvPr id="16" name="Picture 15"/>
-          <p:cNvPicPr>
-            <a:picLocks/>
-          </p:cNvPicPr>
-          <p:nvPr/>
-        </p:nvPicPr>
-        <p:blipFill>
-          <a:blip r:embed="rId7"/>
-          <a:stretch>
-            <a:fillRect/>
-          </a:stretch>
-        </p:blipFill>
-        <p:spPr>
-          <a:xfrm>
-            <a:off x="9175056" y="718887"/>
-            <a:ext cx="2880000" cy="2520000"/>
-          </a:xfrm>
-          <a:prstGeom prst="rect">
-            <a:avLst/>
-          </a:prstGeom>
-        </p:spPr>
-      </p:pic>
-      <p:pic>
-        <p:nvPicPr>
-          <p:cNvPr id="17" name="Picture 16"/>
-          <p:cNvPicPr>
-            <a:picLocks/>
-          </p:cNvPicPr>
-          <p:nvPr/>
-        </p:nvPicPr>
-        <p:blipFill>
-          <a:blip r:embed="rId8"/>
-          <a:stretch>
-            <a:fillRect/>
-          </a:stretch>
-        </p:blipFill>
-        <p:spPr>
-          <a:xfrm>
-            <a:off x="6295056" y="3597773"/>
-            <a:ext cx="2880000" cy="2520000"/>
-          </a:xfrm>
-          <a:prstGeom prst="rect">
-            <a:avLst/>
-          </a:prstGeom>
-        </p:spPr>
-      </p:pic>
-      <p:pic>
-        <p:nvPicPr>
-          <p:cNvPr id="18" name="Picture 17"/>
-          <p:cNvPicPr>
-            <a:picLocks/>
-          </p:cNvPicPr>
-          <p:nvPr/>
-        </p:nvPicPr>
-        <p:blipFill>
-          <a:blip r:embed="rId9"/>
-          <a:stretch>
-            <a:fillRect/>
-          </a:stretch>
-        </p:blipFill>
-        <p:spPr>
-          <a:xfrm>
-            <a:off x="9276204" y="3597773"/>
-            <a:ext cx="2880000" cy="2520000"/>
+            <a:off x="5887453" y="1452813"/>
+            <a:ext cx="5334000" cy="4000500"/>
           </a:xfrm>
           <a:prstGeom prst="rect">
             <a:avLst/>
@@ -4140,7 +4565,7 @@
     </p:spTree>
     <p:extLst>
       <p:ext uri="{BB962C8B-B14F-4D97-AF65-F5344CB8AC3E}">
-        <p14:creationId xmlns:p14="http://schemas.microsoft.com/office/powerpoint/2010/main" val="4061405861"/>
+        <p14:creationId xmlns:p14="http://schemas.microsoft.com/office/powerpoint/2010/main" val="4264760487"/>
       </p:ext>
     </p:extLst>
   </p:cSld>
@@ -4179,8 +4604,8 @@
         </p:nvSpPr>
         <p:spPr>
           <a:xfrm>
-            <a:off x="1792705" y="0"/>
-            <a:ext cx="9416716" cy="1325563"/>
+            <a:off x="802105" y="1"/>
+            <a:ext cx="10515600" cy="866274"/>
           </a:xfrm>
         </p:spPr>
         <p:txBody>
@@ -4190,30 +4615,10 @@
           <a:lstStyle/>
           <a:p>
             <a:r>
-              <a:rPr lang="en-GB" sz="3100" dirty="0" err="1" smtClean="0"/>
-              <a:t>sym_cut</a:t>
-            </a:r>
-            <a:r>
-              <a:rPr lang="en-GB" sz="3100" dirty="0" smtClean="0"/>
-              <a:t> with </a:t>
-            </a:r>
-            <a:r>
-              <a:rPr lang="en-GB" sz="3200" dirty="0" smtClean="0"/>
-              <a:t>Background2 (</a:t>
-            </a:r>
-            <a:r>
-              <a:rPr lang="en-GB" sz="3200" b="1" dirty="0" err="1" smtClean="0"/>
-              <a:t>average_cut</a:t>
-            </a:r>
-            <a:r>
-              <a:rPr lang="en-GB" sz="3200" b="1" dirty="0" smtClean="0"/>
-              <a:t>)</a:t>
-            </a:r>
-            <a:r>
-              <a:rPr lang="en-GB" sz="3200" dirty="0" smtClean="0"/>
-              <a:t>:</a:t>
-            </a:r>
-            <a:endParaRPr lang="en-GB" dirty="0"/>
+              <a:rPr lang="en-GB" sz="2400" dirty="0" smtClean="0"/>
+              <a:t>Partial cuts:</a:t>
+            </a:r>
+            <a:endParaRPr lang="en-GB" sz="2400" dirty="0"/>
           </a:p>
         </p:txBody>
       </p:sp>
@@ -4221,7 +4626,7 @@
         <p:nvPicPr>
           <p:cNvPr id="3" name="Picture 2"/>
           <p:cNvPicPr>
-            <a:picLocks noChangeAspect="1"/>
+            <a:picLocks/>
           </p:cNvPicPr>
           <p:nvPr/>
         </p:nvPicPr>
@@ -4233,8 +4638,8 @@
         </p:blipFill>
         <p:spPr>
           <a:xfrm>
-            <a:off x="180466" y="1428750"/>
-            <a:ext cx="5334000" cy="4000500"/>
+            <a:off x="433908" y="718887"/>
+            <a:ext cx="2880000" cy="2520000"/>
           </a:xfrm>
           <a:prstGeom prst="rect">
             <a:avLst/>
@@ -4243,9 +4648,9 @@
       </p:pic>
       <p:pic>
         <p:nvPicPr>
-          <p:cNvPr id="9" name="Picture 8"/>
+          <p:cNvPr id="5" name="Picture 4"/>
           <p:cNvPicPr>
-            <a:picLocks noChangeAspect="1"/>
+            <a:picLocks/>
           </p:cNvPicPr>
           <p:nvPr/>
         </p:nvPicPr>
@@ -4257,60 +4662,162 @@
         </p:blipFill>
         <p:spPr>
           <a:xfrm>
-            <a:off x="5678911" y="1440782"/>
-            <a:ext cx="5334000" cy="4000500"/>
+            <a:off x="3179905" y="718887"/>
+            <a:ext cx="2880000" cy="2520000"/>
           </a:xfrm>
           <a:prstGeom prst="rect">
             <a:avLst/>
           </a:prstGeom>
         </p:spPr>
       </p:pic>
-      <p:sp>
-        <p:nvSpPr>
-          <p:cNvPr id="10" name="TextBox 9"/>
-          <p:cNvSpPr txBox="1"/>
+      <p:pic>
+        <p:nvPicPr>
+          <p:cNvPr id="7" name="Picture 6"/>
+          <p:cNvPicPr>
+            <a:picLocks/>
+          </p:cNvPicPr>
           <p:nvPr/>
-        </p:nvSpPr>
-        <p:spPr>
-          <a:xfrm>
-            <a:off x="2382252" y="5859379"/>
-            <a:ext cx="4235115" cy="369332"/>
+        </p:nvPicPr>
+        <p:blipFill>
+          <a:blip r:embed="rId4"/>
+          <a:stretch>
+            <a:fillRect/>
+          </a:stretch>
+        </p:blipFill>
+        <p:spPr>
+          <a:xfrm>
+            <a:off x="332760" y="3597773"/>
+            <a:ext cx="2880000" cy="2520000"/>
           </a:xfrm>
           <a:prstGeom prst="rect">
             <a:avLst/>
           </a:prstGeom>
-          <a:noFill/>
-        </p:spPr>
-        <p:txBody>
-          <a:bodyPr wrap="square" rtlCol="0">
-            <a:spAutoFit/>
-          </a:bodyPr>
-          <a:lstStyle/>
-          <a:p>
-            <a:r>
-              <a:rPr lang="en-GB" dirty="0" smtClean="0"/>
-              <a:t>Fitting parameters: </a:t>
-            </a:r>
-            <a:r>
-              <a:rPr lang="en-GB" b="1" dirty="0"/>
-              <a:t>[0.437546 </a:t>
-            </a:r>
-            <a:r>
-              <a:rPr lang="en-GB" b="1" dirty="0" smtClean="0"/>
-              <a:t>0.014128</a:t>
-            </a:r>
-            <a:r>
-              <a:rPr lang="en-GB" dirty="0" smtClean="0"/>
-              <a:t>]</a:t>
-            </a:r>
-            <a:endParaRPr lang="en-GB" dirty="0"/>
-          </a:p>
-        </p:txBody>
-      </p:sp>
+        </p:spPr>
+      </p:pic>
+      <p:pic>
+        <p:nvPicPr>
+          <p:cNvPr id="8" name="Picture 7"/>
+          <p:cNvPicPr>
+            <a:picLocks/>
+          </p:cNvPicPr>
+          <p:nvPr/>
+        </p:nvPicPr>
+        <p:blipFill>
+          <a:blip r:embed="rId5"/>
+          <a:stretch>
+            <a:fillRect/>
+          </a:stretch>
+        </p:blipFill>
+        <p:spPr>
+          <a:xfrm>
+            <a:off x="3313908" y="3597773"/>
+            <a:ext cx="2880000" cy="2520000"/>
+          </a:xfrm>
+          <a:prstGeom prst="rect">
+            <a:avLst/>
+          </a:prstGeom>
+        </p:spPr>
+      </p:pic>
+      <p:pic>
+        <p:nvPicPr>
+          <p:cNvPr id="9" name="Picture 8"/>
+          <p:cNvPicPr>
+            <a:picLocks/>
+          </p:cNvPicPr>
+          <p:nvPr/>
+        </p:nvPicPr>
+        <p:blipFill>
+          <a:blip r:embed="rId6"/>
+          <a:stretch>
+            <a:fillRect/>
+          </a:stretch>
+        </p:blipFill>
+        <p:spPr>
+          <a:xfrm>
+            <a:off x="6295056" y="716324"/>
+            <a:ext cx="2880000" cy="2520000"/>
+          </a:xfrm>
+          <a:prstGeom prst="rect">
+            <a:avLst/>
+          </a:prstGeom>
+        </p:spPr>
+      </p:pic>
+      <p:pic>
+        <p:nvPicPr>
+          <p:cNvPr id="16" name="Picture 15"/>
+          <p:cNvPicPr>
+            <a:picLocks/>
+          </p:cNvPicPr>
+          <p:nvPr/>
+        </p:nvPicPr>
+        <p:blipFill>
+          <a:blip r:embed="rId7"/>
+          <a:stretch>
+            <a:fillRect/>
+          </a:stretch>
+        </p:blipFill>
+        <p:spPr>
+          <a:xfrm>
+            <a:off x="9175056" y="718887"/>
+            <a:ext cx="2880000" cy="2520000"/>
+          </a:xfrm>
+          <a:prstGeom prst="rect">
+            <a:avLst/>
+          </a:prstGeom>
+        </p:spPr>
+      </p:pic>
+      <p:pic>
+        <p:nvPicPr>
+          <p:cNvPr id="17" name="Picture 16"/>
+          <p:cNvPicPr>
+            <a:picLocks/>
+          </p:cNvPicPr>
+          <p:nvPr/>
+        </p:nvPicPr>
+        <p:blipFill>
+          <a:blip r:embed="rId8"/>
+          <a:stretch>
+            <a:fillRect/>
+          </a:stretch>
+        </p:blipFill>
+        <p:spPr>
+          <a:xfrm>
+            <a:off x="6295056" y="3597773"/>
+            <a:ext cx="2880000" cy="2520000"/>
+          </a:xfrm>
+          <a:prstGeom prst="rect">
+            <a:avLst/>
+          </a:prstGeom>
+        </p:spPr>
+      </p:pic>
+      <p:pic>
+        <p:nvPicPr>
+          <p:cNvPr id="18" name="Picture 17"/>
+          <p:cNvPicPr>
+            <a:picLocks/>
+          </p:cNvPicPr>
+          <p:nvPr/>
+        </p:nvPicPr>
+        <p:blipFill>
+          <a:blip r:embed="rId9"/>
+          <a:stretch>
+            <a:fillRect/>
+          </a:stretch>
+        </p:blipFill>
+        <p:spPr>
+          <a:xfrm>
+            <a:off x="9276204" y="3597773"/>
+            <a:ext cx="2880000" cy="2520000"/>
+          </a:xfrm>
+          <a:prstGeom prst="rect">
+            <a:avLst/>
+          </a:prstGeom>
+        </p:spPr>
+      </p:pic>
     </p:spTree>
     <p:extLst>
       <p:ext uri="{BB962C8B-B14F-4D97-AF65-F5344CB8AC3E}">
-        <p14:creationId xmlns:p14="http://schemas.microsoft.com/office/powerpoint/2010/main" val="2469319558"/>
+        <p14:creationId xmlns:p14="http://schemas.microsoft.com/office/powerpoint/2010/main" val="4061405861"/>
       </p:ext>
     </p:extLst>
   </p:cSld>
@@ -4339,63 +4846,57 @@
       </p:grpSpPr>
       <p:sp>
         <p:nvSpPr>
-          <p:cNvPr id="4" name="Rectangle 3"/>
-          <p:cNvSpPr/>
-          <p:nvPr/>
-        </p:nvSpPr>
-        <p:spPr>
-          <a:xfrm>
-            <a:off x="689811" y="302477"/>
-            <a:ext cx="6096000" cy="923330"/>
-          </a:xfrm>
-          <a:prstGeom prst="rect">
-            <a:avLst/>
-          </a:prstGeom>
+          <p:cNvPr id="2" name="Title 1"/>
+          <p:cNvSpPr>
+            <a:spLocks noGrp="1"/>
+          </p:cNvSpPr>
+          <p:nvPr>
+            <p:ph type="title"/>
+          </p:nvPr>
+        </p:nvSpPr>
+        <p:spPr>
+          <a:xfrm>
+            <a:off x="1792705" y="0"/>
+            <a:ext cx="9416716" cy="1325563"/>
+          </a:xfrm>
         </p:spPr>
         <p:txBody>
           <a:bodyPr>
-            <a:spAutoFit/>
+            <a:normAutofit/>
           </a:bodyPr>
           <a:lstStyle/>
           <a:p>
             <a:r>
-              <a:rPr lang="en-GB" dirty="0" smtClean="0"/>
-              <a:t>Background3 (</a:t>
-            </a:r>
-            <a:r>
-              <a:rPr lang="en-GB" dirty="0" err="1" smtClean="0"/>
-              <a:t>remote</a:t>
-            </a:r>
-            <a:r>
-              <a:rPr lang="en-GB" b="1" dirty="0" err="1" smtClean="0"/>
-              <a:t>_cut</a:t>
-            </a:r>
-            <a:r>
-              <a:rPr lang="en-GB" b="1" dirty="0" smtClean="0"/>
+              <a:rPr lang="en-GB" sz="3100" dirty="0" err="1" smtClean="0"/>
+              <a:t>sym_cut</a:t>
+            </a:r>
+            <a:r>
+              <a:rPr lang="en-GB" sz="3100" dirty="0" smtClean="0"/>
+              <a:t> with </a:t>
+            </a:r>
+            <a:r>
+              <a:rPr lang="en-GB" sz="3200" dirty="0" smtClean="0"/>
+              <a:t>Background2 (</a:t>
+            </a:r>
+            <a:r>
+              <a:rPr lang="en-GB" sz="3200" b="1" dirty="0" err="1" smtClean="0"/>
+              <a:t>average_cut</a:t>
+            </a:r>
+            <a:r>
+              <a:rPr lang="en-GB" sz="3200" b="1" dirty="0" smtClean="0"/>
               <a:t>)</a:t>
             </a:r>
             <a:r>
-              <a:rPr lang="en-GB" dirty="0" smtClean="0"/>
-              <a:t>: Overcompensation. Ideas for high energy backgroun</a:t>
-            </a:r>
-            <a:r>
-              <a:rPr lang="en-GB" dirty="0" smtClean="0"/>
-              <a:t>d removal.</a:t>
-            </a:r>
-            <a:r>
-              <a:rPr lang="en-GB" dirty="0" smtClean="0"/>
-              <a:t/>
-            </a:r>
-            <a:br>
-              <a:rPr lang="en-GB" dirty="0" smtClean="0"/>
-            </a:br>
+              <a:rPr lang="en-GB" sz="3200" dirty="0" smtClean="0"/>
+              <a:t>:</a:t>
+            </a:r>
             <a:endParaRPr lang="en-GB" dirty="0"/>
           </a:p>
         </p:txBody>
       </p:sp>
       <p:pic>
         <p:nvPicPr>
-          <p:cNvPr id="2" name="Picture 1"/>
+          <p:cNvPr id="3" name="Picture 2"/>
           <p:cNvPicPr>
             <a:picLocks noChangeAspect="1"/>
           </p:cNvPicPr>
@@ -4409,7 +4910,7 @@
         </p:blipFill>
         <p:spPr>
           <a:xfrm>
-            <a:off x="324853" y="1452813"/>
+            <a:off x="180466" y="1428750"/>
             <a:ext cx="5334000" cy="4000500"/>
           </a:xfrm>
           <a:prstGeom prst="rect">
@@ -4419,7 +4920,7 @@
       </p:pic>
       <p:pic>
         <p:nvPicPr>
-          <p:cNvPr id="3" name="Picture 2"/>
+          <p:cNvPr id="9" name="Picture 8"/>
           <p:cNvPicPr>
             <a:picLocks noChangeAspect="1"/>
           </p:cNvPicPr>
@@ -4433,7 +4934,7 @@
         </p:blipFill>
         <p:spPr>
           <a:xfrm>
-            <a:off x="6328611" y="1452813"/>
+            <a:off x="5678911" y="1440782"/>
             <a:ext cx="5334000" cy="4000500"/>
           </a:xfrm>
           <a:prstGeom prst="rect">
@@ -4443,14 +4944,14 @@
       </p:pic>
       <p:sp>
         <p:nvSpPr>
-          <p:cNvPr id="8" name="TextBox 7"/>
+          <p:cNvPr id="10" name="TextBox 9"/>
           <p:cNvSpPr txBox="1"/>
           <p:nvPr/>
         </p:nvSpPr>
         <p:spPr>
           <a:xfrm>
-            <a:off x="689811" y="5859379"/>
-            <a:ext cx="8586536" cy="369332"/>
+            <a:off x="2382252" y="5859379"/>
+            <a:ext cx="4235115" cy="369332"/>
           </a:xfrm>
           <a:prstGeom prst="rect">
             <a:avLst/>
@@ -4468,12 +4969,8 @@
               <a:t>Fitting parameters: </a:t>
             </a:r>
             <a:r>
-              <a:rPr lang="en-GB" b="1" dirty="0" smtClean="0"/>
-              <a:t>[</a:t>
-            </a:r>
-            <a:r>
               <a:rPr lang="en-GB" b="1" dirty="0"/>
-              <a:t>0.437546 </a:t>
+              <a:t>[0.437546 </a:t>
             </a:r>
             <a:r>
               <a:rPr lang="en-GB" b="1" dirty="0" smtClean="0"/>
@@ -4481,7 +4978,7 @@
             </a:r>
             <a:r>
               <a:rPr lang="en-GB" dirty="0" smtClean="0"/>
-              <a:t>]; Overcompensation</a:t>
+              <a:t>]</a:t>
             </a:r>
             <a:endParaRPr lang="en-GB" dirty="0"/>
           </a:p>
@@ -4490,7 +4987,7 @@
     </p:spTree>
     <p:extLst>
       <p:ext uri="{BB962C8B-B14F-4D97-AF65-F5344CB8AC3E}">
-        <p14:creationId xmlns:p14="http://schemas.microsoft.com/office/powerpoint/2010/main" val="2444435092"/>
+        <p14:creationId xmlns:p14="http://schemas.microsoft.com/office/powerpoint/2010/main" val="2469319558"/>
       </p:ext>
     </p:extLst>
   </p:cSld>
@@ -4519,39 +5016,63 @@
       </p:grpSpPr>
       <p:sp>
         <p:nvSpPr>
-          <p:cNvPr id="2" name="Title 1"/>
-          <p:cNvSpPr>
-            <a:spLocks noGrp="1"/>
-          </p:cNvSpPr>
-          <p:nvPr>
-            <p:ph type="title"/>
-          </p:nvPr>
-        </p:nvSpPr>
-        <p:spPr/>
-        <p:txBody>
-          <a:bodyPr/>
+          <p:cNvPr id="4" name="Rectangle 3"/>
+          <p:cNvSpPr/>
+          <p:nvPr/>
+        </p:nvSpPr>
+        <p:spPr>
+          <a:xfrm>
+            <a:off x="689810" y="302477"/>
+            <a:ext cx="10114547" cy="923330"/>
+          </a:xfrm>
+          <a:prstGeom prst="rect">
+            <a:avLst/>
+          </a:prstGeom>
+        </p:spPr>
+        <p:txBody>
+          <a:bodyPr wrap="square">
+            <a:spAutoFit/>
+          </a:bodyPr>
           <a:lstStyle/>
           <a:p>
             <a:r>
               <a:rPr lang="en-GB" dirty="0" smtClean="0"/>
-              <a:t>Summary: All backgrounds are good enough. </a:t>
+              <a:t>Background3 (</a:t>
+            </a:r>
+            <a:r>
+              <a:rPr lang="en-GB" dirty="0" err="1" smtClean="0"/>
+              <a:t>remote</a:t>
+            </a:r>
+            <a:r>
+              <a:rPr lang="en-GB" b="1" dirty="0" err="1" smtClean="0"/>
+              <a:t>_cut</a:t>
+            </a:r>
+            <a:r>
+              <a:rPr lang="en-GB" b="1" dirty="0" smtClean="0"/>
+              <a:t>)</a:t>
+            </a:r>
+            <a:r>
+              <a:rPr lang="en-GB" dirty="0" smtClean="0"/>
+              <a:t>: Overcompensation. We can not use this background.</a:t>
+            </a:r>
+          </a:p>
+          <a:p>
+            <a:r>
+              <a:rPr lang="en-GB" dirty="0" smtClean="0"/>
+              <a:t>Need ideas for high energy transfer background removal.</a:t>
             </a:r>
             <a:br>
               <a:rPr lang="en-GB" dirty="0" smtClean="0"/>
             </a:br>
-            <a:r>
-              <a:rPr lang="en-GB" dirty="0" smtClean="0"/>
-              <a:t>What about high energy range?</a:t>
-            </a:r>
             <a:endParaRPr lang="en-GB" dirty="0"/>
           </a:p>
         </p:txBody>
       </p:sp>
       <p:pic>
         <p:nvPicPr>
-          <p:cNvPr id="4" name="Picture 3"/>
+          <p:cNvPr id="2" name="Picture 1"/>
           <p:cNvPicPr>
-            <a:picLocks/>
+            <a:picLocks noChangeAspect="1"/>
           </p:cNvPicPr>
           <p:nvPr/>
         </p:nvPicPr>
@@ -4563,8 +5084,8 @@
         </p:blipFill>
         <p:spPr>
           <a:xfrm>
-            <a:off x="6313800" y="2087730"/>
-            <a:ext cx="5040000" cy="3960000"/>
+            <a:off x="324853" y="1452813"/>
+            <a:ext cx="5334000" cy="4000500"/>
           </a:xfrm>
           <a:prstGeom prst="rect">
             <a:avLst/>
@@ -4573,9 +5094,9 @@
       </p:pic>
       <p:pic>
         <p:nvPicPr>
-          <p:cNvPr id="5" name="Picture 4"/>
+          <p:cNvPr id="3" name="Picture 2"/>
           <p:cNvPicPr>
-            <a:picLocks/>
+            <a:picLocks noChangeAspect="1"/>
           </p:cNvPicPr>
           <p:nvPr/>
         </p:nvPicPr>
@@ -4587,18 +5108,64 @@
         </p:blipFill>
         <p:spPr>
           <a:xfrm>
-            <a:off x="838200" y="2232108"/>
-            <a:ext cx="5040000" cy="3960000"/>
+            <a:off x="6328611" y="1452813"/>
+            <a:ext cx="5334000" cy="4000500"/>
           </a:xfrm>
           <a:prstGeom prst="rect">
             <a:avLst/>
           </a:prstGeom>
         </p:spPr>
       </p:pic>
+      <p:sp>
+        <p:nvSpPr>
+          <p:cNvPr id="8" name="TextBox 7"/>
+          <p:cNvSpPr txBox="1"/>
+          <p:nvPr/>
+        </p:nvSpPr>
+        <p:spPr>
+          <a:xfrm>
+            <a:off x="689811" y="5859379"/>
+            <a:ext cx="10972800" cy="369332"/>
+          </a:xfrm>
+          <a:prstGeom prst="rect">
+            <a:avLst/>
+          </a:prstGeom>
+          <a:noFill/>
+        </p:spPr>
+        <p:txBody>
+          <a:bodyPr wrap="square" rtlCol="0">
+            <a:spAutoFit/>
+          </a:bodyPr>
+          <a:lstStyle/>
+          <a:p>
+            <a:r>
+              <a:rPr lang="en-GB" dirty="0" smtClean="0"/>
+              <a:t>Fitting parameters: </a:t>
+            </a:r>
+            <a:r>
+              <a:rPr lang="en-GB" b="1" dirty="0" smtClean="0"/>
+              <a:t>[</a:t>
+            </a:r>
+            <a:r>
+              <a:rPr lang="en-GB" b="1" dirty="0"/>
+              <a:t>0.437546 </a:t>
+            </a:r>
+            <a:r>
+              <a:rPr lang="en-GB" b="1" dirty="0" smtClean="0"/>
+              <a:t>0.014128</a:t>
+            </a:r>
+            <a:r>
+              <a:rPr lang="en-GB" dirty="0" smtClean="0"/>
+              <a:t>]; Overcompensation. Some homogeneous magnetic scattering at high Q</a:t>
+            </a:r>
+            <a:endParaRPr lang="en-GB" dirty="0"/>
+          </a:p>
+        </p:txBody>
+      </p:sp>
     </p:spTree>
     <p:extLst>
       <p:ext uri="{BB962C8B-B14F-4D97-AF65-F5344CB8AC3E}">
-        <p14:creationId xmlns:p14="http://schemas.microsoft.com/office/powerpoint/2010/main" val="432591689"/>
+        <p14:creationId xmlns:p14="http://schemas.microsoft.com/office/powerpoint/2010/main" val="2444435092"/>
       </p:ext>
     </p:extLst>
   </p:cSld>

</xml_diff>